<commit_message>
undone work for 2/20/17
</commit_message>
<xml_diff>
--- a/Spring 2017 Semester/Music or Arts/ARUS HW/6 ARUS HW/ARUS HW#6 notes.pptx
+++ b/Spring 2017 Semester/Music or Arts/ARUS HW/6 ARUS HW/ARUS HW#6 notes.pptx
@@ -2,12 +2,12 @@
 <file path=ppt/presentation.xml><?xml version="1.0" encoding="utf-8"?>
 <p:presentation xmlns:a="http://schemas.openxmlformats.org/drawingml/2006/main" xmlns:r="http://schemas.openxmlformats.org/officeDocument/2006/relationships" xmlns:p="http://schemas.openxmlformats.org/presentationml/2006/main" saveSubsetFonts="1">
   <p:sldMasterIdLst>
-    <p:sldMasterId id="2147483648" r:id="rId1"/>
+    <p:sldMasterId id="2147483659" r:id="rId1"/>
   </p:sldMasterIdLst>
   <p:sldIdLst>
     <p:sldId id="256" r:id="rId2"/>
-    <p:sldId id="258" r:id="rId3"/>
-    <p:sldId id="257" r:id="rId4"/>
+    <p:sldId id="257" r:id="rId3"/>
+    <p:sldId id="258" r:id="rId4"/>
     <p:sldId id="259" r:id="rId5"/>
     <p:sldId id="260" r:id="rId6"/>
     <p:sldId id="261" r:id="rId7"/>
@@ -41,6 +41,25 @@
     <p:sldId id="289" r:id="rId35"/>
     <p:sldId id="290" r:id="rId36"/>
     <p:sldId id="291" r:id="rId37"/>
+    <p:sldId id="292" r:id="rId38"/>
+    <p:sldId id="293" r:id="rId39"/>
+    <p:sldId id="294" r:id="rId40"/>
+    <p:sldId id="295" r:id="rId41"/>
+    <p:sldId id="296" r:id="rId42"/>
+    <p:sldId id="297" r:id="rId43"/>
+    <p:sldId id="298" r:id="rId44"/>
+    <p:sldId id="299" r:id="rId45"/>
+    <p:sldId id="300" r:id="rId46"/>
+    <p:sldId id="301" r:id="rId47"/>
+    <p:sldId id="302" r:id="rId48"/>
+    <p:sldId id="303" r:id="rId49"/>
+    <p:sldId id="304" r:id="rId50"/>
+    <p:sldId id="305" r:id="rId51"/>
+    <p:sldId id="306" r:id="rId52"/>
+    <p:sldId id="307" r:id="rId53"/>
+    <p:sldId id="308" r:id="rId54"/>
+    <p:sldId id="309" r:id="rId55"/>
+    <p:sldId id="310" r:id="rId56"/>
   </p:sldIdLst>
   <p:sldSz cx="12192000" cy="6858000"/>
   <p:notesSz cx="6858000" cy="9144000"/>
@@ -181,7 +200,7 @@
           </a:xfrm>
         </p:spPr>
         <p:txBody>
-          <a:bodyPr anchor="b"/>
+          <a:bodyPr numCol="1" anchor="b"/>
           <a:lstStyle>
             <a:lvl1pPr algn="ctr">
               <a:defRPr sz="6000"/>
@@ -213,7 +232,7 @@
           </a:xfrm>
         </p:spPr>
         <p:txBody>
-          <a:bodyPr/>
+          <a:bodyPr numCol="1"/>
           <a:lstStyle>
             <a:lvl1pPr marL="0" indent="0" algn="ctr">
               <a:buNone/>
@@ -273,12 +292,12 @@
         </p:nvSpPr>
         <p:spPr/>
         <p:txBody>
-          <a:bodyPr/>
+          <a:bodyPr numCol="1"/>
           <a:lstStyle/>
           <a:p>
             <a:fld id="{565AE5A7-D644-464D-B982-26090501DA72}" type="datetimeFigureOut">
               <a:rPr lang="en-US" smtClean="0"/>
-              <a:t>2/16/2017</a:t>
+              <a:t>2/20/2017</a:t>
             </a:fld>
             <a:endParaRPr lang="en-US"/>
           </a:p>
@@ -296,7 +315,7 @@
         </p:nvSpPr>
         <p:spPr/>
         <p:txBody>
-          <a:bodyPr/>
+          <a:bodyPr numCol="1"/>
           <a:lstStyle/>
           <a:p>
             <a:endParaRPr lang="en-US"/>
@@ -315,7 +334,7 @@
         </p:nvSpPr>
         <p:spPr/>
         <p:txBody>
-          <a:bodyPr/>
+          <a:bodyPr numCol="1"/>
           <a:lstStyle/>
           <a:p>
             <a:fld id="{F85CA616-104E-4A84-ABF0-22257A41171C}" type="slidenum">
@@ -368,7 +387,7 @@
         </p:nvSpPr>
         <p:spPr/>
         <p:txBody>
-          <a:bodyPr/>
+          <a:bodyPr numCol="1"/>
           <a:lstStyle/>
           <a:p>
             <a:r>
@@ -391,7 +410,7 @@
         </p:nvSpPr>
         <p:spPr/>
         <p:txBody>
-          <a:bodyPr vert="eaVert"/>
+          <a:bodyPr vert="eaVert" numCol="1"/>
           <a:lstStyle/>
           <a:p>
             <a:pPr lvl="0"/>
@@ -443,12 +462,12 @@
         </p:nvSpPr>
         <p:spPr/>
         <p:txBody>
-          <a:bodyPr/>
+          <a:bodyPr numCol="1"/>
           <a:lstStyle/>
           <a:p>
             <a:fld id="{565AE5A7-D644-464D-B982-26090501DA72}" type="datetimeFigureOut">
               <a:rPr lang="en-US" smtClean="0"/>
-              <a:t>2/16/2017</a:t>
+              <a:t>2/20/2017</a:t>
             </a:fld>
             <a:endParaRPr lang="en-US"/>
           </a:p>
@@ -466,7 +485,7 @@
         </p:nvSpPr>
         <p:spPr/>
         <p:txBody>
-          <a:bodyPr/>
+          <a:bodyPr numCol="1"/>
           <a:lstStyle/>
           <a:p>
             <a:endParaRPr lang="en-US"/>
@@ -485,7 +504,7 @@
         </p:nvSpPr>
         <p:spPr/>
         <p:txBody>
-          <a:bodyPr/>
+          <a:bodyPr numCol="1"/>
           <a:lstStyle/>
           <a:p>
             <a:fld id="{F85CA616-104E-4A84-ABF0-22257A41171C}" type="slidenum">
@@ -543,7 +562,7 @@
           </a:xfrm>
         </p:spPr>
         <p:txBody>
-          <a:bodyPr vert="eaVert"/>
+          <a:bodyPr vert="eaVert" numCol="1"/>
           <a:lstStyle/>
           <a:p>
             <a:r>
@@ -571,7 +590,7 @@
           </a:xfrm>
         </p:spPr>
         <p:txBody>
-          <a:bodyPr vert="eaVert"/>
+          <a:bodyPr vert="eaVert" numCol="1"/>
           <a:lstStyle/>
           <a:p>
             <a:pPr lvl="0"/>
@@ -623,12 +642,12 @@
         </p:nvSpPr>
         <p:spPr/>
         <p:txBody>
-          <a:bodyPr/>
+          <a:bodyPr numCol="1"/>
           <a:lstStyle/>
           <a:p>
             <a:fld id="{565AE5A7-D644-464D-B982-26090501DA72}" type="datetimeFigureOut">
               <a:rPr lang="en-US" smtClean="0"/>
-              <a:t>2/16/2017</a:t>
+              <a:t>2/20/2017</a:t>
             </a:fld>
             <a:endParaRPr lang="en-US"/>
           </a:p>
@@ -646,7 +665,7 @@
         </p:nvSpPr>
         <p:spPr/>
         <p:txBody>
-          <a:bodyPr/>
+          <a:bodyPr numCol="1"/>
           <a:lstStyle/>
           <a:p>
             <a:endParaRPr lang="en-US"/>
@@ -665,7 +684,7 @@
         </p:nvSpPr>
         <p:spPr/>
         <p:txBody>
-          <a:bodyPr/>
+          <a:bodyPr numCol="1"/>
           <a:lstStyle/>
           <a:p>
             <a:fld id="{F85CA616-104E-4A84-ABF0-22257A41171C}" type="slidenum">
@@ -718,7 +737,7 @@
         </p:nvSpPr>
         <p:spPr/>
         <p:txBody>
-          <a:bodyPr/>
+          <a:bodyPr numCol="1"/>
           <a:lstStyle/>
           <a:p>
             <a:r>
@@ -741,7 +760,7 @@
         </p:nvSpPr>
         <p:spPr/>
         <p:txBody>
-          <a:bodyPr/>
+          <a:bodyPr numCol="1"/>
           <a:lstStyle/>
           <a:p>
             <a:pPr lvl="0"/>
@@ -793,12 +812,12 @@
         </p:nvSpPr>
         <p:spPr/>
         <p:txBody>
-          <a:bodyPr/>
+          <a:bodyPr numCol="1"/>
           <a:lstStyle/>
           <a:p>
             <a:fld id="{565AE5A7-D644-464D-B982-26090501DA72}" type="datetimeFigureOut">
               <a:rPr lang="en-US" smtClean="0"/>
-              <a:t>2/16/2017</a:t>
+              <a:t>2/20/2017</a:t>
             </a:fld>
             <a:endParaRPr lang="en-US"/>
           </a:p>
@@ -816,7 +835,7 @@
         </p:nvSpPr>
         <p:spPr/>
         <p:txBody>
-          <a:bodyPr/>
+          <a:bodyPr numCol="1"/>
           <a:lstStyle/>
           <a:p>
             <a:endParaRPr lang="en-US"/>
@@ -835,7 +854,7 @@
         </p:nvSpPr>
         <p:spPr/>
         <p:txBody>
-          <a:bodyPr/>
+          <a:bodyPr numCol="1"/>
           <a:lstStyle/>
           <a:p>
             <a:fld id="{F85CA616-104E-4A84-ABF0-22257A41171C}" type="slidenum">
@@ -893,7 +912,7 @@
           </a:xfrm>
         </p:spPr>
         <p:txBody>
-          <a:bodyPr anchor="b"/>
+          <a:bodyPr numCol="1" anchor="b"/>
           <a:lstStyle>
             <a:lvl1pPr>
               <a:defRPr sz="6000"/>
@@ -925,7 +944,7 @@
           </a:xfrm>
         </p:spPr>
         <p:txBody>
-          <a:bodyPr/>
+          <a:bodyPr numCol="1"/>
           <a:lstStyle>
             <a:lvl1pPr marL="0" indent="0">
               <a:buNone/>
@@ -1039,12 +1058,12 @@
         </p:nvSpPr>
         <p:spPr/>
         <p:txBody>
-          <a:bodyPr/>
+          <a:bodyPr numCol="1"/>
           <a:lstStyle/>
           <a:p>
             <a:fld id="{565AE5A7-D644-464D-B982-26090501DA72}" type="datetimeFigureOut">
               <a:rPr lang="en-US" smtClean="0"/>
-              <a:t>2/16/2017</a:t>
+              <a:t>2/20/2017</a:t>
             </a:fld>
             <a:endParaRPr lang="en-US"/>
           </a:p>
@@ -1062,7 +1081,7 @@
         </p:nvSpPr>
         <p:spPr/>
         <p:txBody>
-          <a:bodyPr/>
+          <a:bodyPr numCol="1"/>
           <a:lstStyle/>
           <a:p>
             <a:endParaRPr lang="en-US"/>
@@ -1081,7 +1100,7 @@
         </p:nvSpPr>
         <p:spPr/>
         <p:txBody>
-          <a:bodyPr/>
+          <a:bodyPr numCol="1"/>
           <a:lstStyle/>
           <a:p>
             <a:fld id="{F85CA616-104E-4A84-ABF0-22257A41171C}" type="slidenum">
@@ -1134,7 +1153,7 @@
         </p:nvSpPr>
         <p:spPr/>
         <p:txBody>
-          <a:bodyPr/>
+          <a:bodyPr numCol="1"/>
           <a:lstStyle/>
           <a:p>
             <a:r>
@@ -1162,7 +1181,7 @@
           </a:xfrm>
         </p:spPr>
         <p:txBody>
-          <a:bodyPr/>
+          <a:bodyPr numCol="1"/>
           <a:lstStyle/>
           <a:p>
             <a:pPr lvl="0"/>
@@ -1219,7 +1238,7 @@
           </a:xfrm>
         </p:spPr>
         <p:txBody>
-          <a:bodyPr/>
+          <a:bodyPr numCol="1"/>
           <a:lstStyle/>
           <a:p>
             <a:pPr lvl="0"/>
@@ -1271,12 +1290,12 @@
         </p:nvSpPr>
         <p:spPr/>
         <p:txBody>
-          <a:bodyPr/>
+          <a:bodyPr numCol="1"/>
           <a:lstStyle/>
           <a:p>
             <a:fld id="{565AE5A7-D644-464D-B982-26090501DA72}" type="datetimeFigureOut">
               <a:rPr lang="en-US" smtClean="0"/>
-              <a:t>2/16/2017</a:t>
+              <a:t>2/20/2017</a:t>
             </a:fld>
             <a:endParaRPr lang="en-US"/>
           </a:p>
@@ -1294,7 +1313,7 @@
         </p:nvSpPr>
         <p:spPr/>
         <p:txBody>
-          <a:bodyPr/>
+          <a:bodyPr numCol="1"/>
           <a:lstStyle/>
           <a:p>
             <a:endParaRPr lang="en-US"/>
@@ -1313,7 +1332,7 @@
         </p:nvSpPr>
         <p:spPr/>
         <p:txBody>
-          <a:bodyPr/>
+          <a:bodyPr numCol="1"/>
           <a:lstStyle/>
           <a:p>
             <a:fld id="{F85CA616-104E-4A84-ABF0-22257A41171C}" type="slidenum">
@@ -1371,7 +1390,7 @@
           </a:xfrm>
         </p:spPr>
         <p:txBody>
-          <a:bodyPr/>
+          <a:bodyPr numCol="1"/>
           <a:lstStyle/>
           <a:p>
             <a:r>
@@ -1399,7 +1418,7 @@
           </a:xfrm>
         </p:spPr>
         <p:txBody>
-          <a:bodyPr anchor="b"/>
+          <a:bodyPr numCol="1" anchor="b"/>
           <a:lstStyle>
             <a:lvl1pPr marL="0" indent="0">
               <a:buNone/>
@@ -1464,7 +1483,7 @@
           </a:xfrm>
         </p:spPr>
         <p:txBody>
-          <a:bodyPr/>
+          <a:bodyPr numCol="1"/>
           <a:lstStyle/>
           <a:p>
             <a:pPr lvl="0"/>
@@ -1521,7 +1540,7 @@
           </a:xfrm>
         </p:spPr>
         <p:txBody>
-          <a:bodyPr anchor="b"/>
+          <a:bodyPr numCol="1" anchor="b"/>
           <a:lstStyle>
             <a:lvl1pPr marL="0" indent="0">
               <a:buNone/>
@@ -1586,7 +1605,7 @@
           </a:xfrm>
         </p:spPr>
         <p:txBody>
-          <a:bodyPr/>
+          <a:bodyPr numCol="1"/>
           <a:lstStyle/>
           <a:p>
             <a:pPr lvl="0"/>
@@ -1638,12 +1657,12 @@
         </p:nvSpPr>
         <p:spPr/>
         <p:txBody>
-          <a:bodyPr/>
+          <a:bodyPr numCol="1"/>
           <a:lstStyle/>
           <a:p>
             <a:fld id="{565AE5A7-D644-464D-B982-26090501DA72}" type="datetimeFigureOut">
               <a:rPr lang="en-US" smtClean="0"/>
-              <a:t>2/16/2017</a:t>
+              <a:t>2/20/2017</a:t>
             </a:fld>
             <a:endParaRPr lang="en-US"/>
           </a:p>
@@ -1661,7 +1680,7 @@
         </p:nvSpPr>
         <p:spPr/>
         <p:txBody>
-          <a:bodyPr/>
+          <a:bodyPr numCol="1"/>
           <a:lstStyle/>
           <a:p>
             <a:endParaRPr lang="en-US"/>
@@ -1680,7 +1699,7 @@
         </p:nvSpPr>
         <p:spPr/>
         <p:txBody>
-          <a:bodyPr/>
+          <a:bodyPr numCol="1"/>
           <a:lstStyle/>
           <a:p>
             <a:fld id="{F85CA616-104E-4A84-ABF0-22257A41171C}" type="slidenum">
@@ -1733,7 +1752,7 @@
         </p:nvSpPr>
         <p:spPr/>
         <p:txBody>
-          <a:bodyPr/>
+          <a:bodyPr numCol="1"/>
           <a:lstStyle/>
           <a:p>
             <a:r>
@@ -1756,12 +1775,12 @@
         </p:nvSpPr>
         <p:spPr/>
         <p:txBody>
-          <a:bodyPr/>
+          <a:bodyPr numCol="1"/>
           <a:lstStyle/>
           <a:p>
             <a:fld id="{565AE5A7-D644-464D-B982-26090501DA72}" type="datetimeFigureOut">
               <a:rPr lang="en-US" smtClean="0"/>
-              <a:t>2/16/2017</a:t>
+              <a:t>2/20/2017</a:t>
             </a:fld>
             <a:endParaRPr lang="en-US"/>
           </a:p>
@@ -1779,7 +1798,7 @@
         </p:nvSpPr>
         <p:spPr/>
         <p:txBody>
-          <a:bodyPr/>
+          <a:bodyPr numCol="1"/>
           <a:lstStyle/>
           <a:p>
             <a:endParaRPr lang="en-US"/>
@@ -1798,7 +1817,7 @@
         </p:nvSpPr>
         <p:spPr/>
         <p:txBody>
-          <a:bodyPr/>
+          <a:bodyPr numCol="1"/>
           <a:lstStyle/>
           <a:p>
             <a:fld id="{F85CA616-104E-4A84-ABF0-22257A41171C}" type="slidenum">
@@ -1851,12 +1870,12 @@
         </p:nvSpPr>
         <p:spPr/>
         <p:txBody>
-          <a:bodyPr/>
+          <a:bodyPr numCol="1"/>
           <a:lstStyle/>
           <a:p>
             <a:fld id="{565AE5A7-D644-464D-B982-26090501DA72}" type="datetimeFigureOut">
               <a:rPr lang="en-US" smtClean="0"/>
-              <a:t>2/16/2017</a:t>
+              <a:t>2/20/2017</a:t>
             </a:fld>
             <a:endParaRPr lang="en-US"/>
           </a:p>
@@ -1874,7 +1893,7 @@
         </p:nvSpPr>
         <p:spPr/>
         <p:txBody>
-          <a:bodyPr/>
+          <a:bodyPr numCol="1"/>
           <a:lstStyle/>
           <a:p>
             <a:endParaRPr lang="en-US"/>
@@ -1893,7 +1912,7 @@
         </p:nvSpPr>
         <p:spPr/>
         <p:txBody>
-          <a:bodyPr/>
+          <a:bodyPr numCol="1"/>
           <a:lstStyle/>
           <a:p>
             <a:fld id="{F85CA616-104E-4A84-ABF0-22257A41171C}" type="slidenum">
@@ -1951,7 +1970,7 @@
           </a:xfrm>
         </p:spPr>
         <p:txBody>
-          <a:bodyPr anchor="b"/>
+          <a:bodyPr numCol="1" anchor="b"/>
           <a:lstStyle>
             <a:lvl1pPr>
               <a:defRPr sz="3200"/>
@@ -1983,7 +2002,7 @@
           </a:xfrm>
         </p:spPr>
         <p:txBody>
-          <a:bodyPr/>
+          <a:bodyPr numCol="1"/>
           <a:lstStyle>
             <a:lvl1pPr>
               <a:defRPr sz="3200"/>
@@ -2068,7 +2087,7 @@
           </a:xfrm>
         </p:spPr>
         <p:txBody>
-          <a:bodyPr/>
+          <a:bodyPr numCol="1"/>
           <a:lstStyle>
             <a:lvl1pPr marL="0" indent="0">
               <a:buNone/>
@@ -2128,12 +2147,12 @@
         </p:nvSpPr>
         <p:spPr/>
         <p:txBody>
-          <a:bodyPr/>
+          <a:bodyPr numCol="1"/>
           <a:lstStyle/>
           <a:p>
             <a:fld id="{565AE5A7-D644-464D-B982-26090501DA72}" type="datetimeFigureOut">
               <a:rPr lang="en-US" smtClean="0"/>
-              <a:t>2/16/2017</a:t>
+              <a:t>2/20/2017</a:t>
             </a:fld>
             <a:endParaRPr lang="en-US"/>
           </a:p>
@@ -2151,7 +2170,7 @@
         </p:nvSpPr>
         <p:spPr/>
         <p:txBody>
-          <a:bodyPr/>
+          <a:bodyPr numCol="1"/>
           <a:lstStyle/>
           <a:p>
             <a:endParaRPr lang="en-US"/>
@@ -2170,7 +2189,7 @@
         </p:nvSpPr>
         <p:spPr/>
         <p:txBody>
-          <a:bodyPr/>
+          <a:bodyPr numCol="1"/>
           <a:lstStyle/>
           <a:p>
             <a:fld id="{F85CA616-104E-4A84-ABF0-22257A41171C}" type="slidenum">
@@ -2228,7 +2247,7 @@
           </a:xfrm>
         </p:spPr>
         <p:txBody>
-          <a:bodyPr anchor="b"/>
+          <a:bodyPr numCol="1" anchor="b"/>
           <a:lstStyle>
             <a:lvl1pPr>
               <a:defRPr sz="3200"/>
@@ -2260,7 +2279,7 @@
           </a:xfrm>
         </p:spPr>
         <p:txBody>
-          <a:bodyPr/>
+          <a:bodyPr numCol="1"/>
           <a:lstStyle>
             <a:lvl1pPr marL="0" indent="0">
               <a:buNone/>
@@ -2321,7 +2340,7 @@
           </a:xfrm>
         </p:spPr>
         <p:txBody>
-          <a:bodyPr/>
+          <a:bodyPr numCol="1"/>
           <a:lstStyle>
             <a:lvl1pPr marL="0" indent="0">
               <a:buNone/>
@@ -2381,12 +2400,12 @@
         </p:nvSpPr>
         <p:spPr/>
         <p:txBody>
-          <a:bodyPr/>
+          <a:bodyPr numCol="1"/>
           <a:lstStyle/>
           <a:p>
             <a:fld id="{565AE5A7-D644-464D-B982-26090501DA72}" type="datetimeFigureOut">
               <a:rPr lang="en-US" smtClean="0"/>
-              <a:t>2/16/2017</a:t>
+              <a:t>2/20/2017</a:t>
             </a:fld>
             <a:endParaRPr lang="en-US"/>
           </a:p>
@@ -2404,7 +2423,7 @@
         </p:nvSpPr>
         <p:spPr/>
         <p:txBody>
-          <a:bodyPr/>
+          <a:bodyPr numCol="1"/>
           <a:lstStyle/>
           <a:p>
             <a:endParaRPr lang="en-US"/>
@@ -2423,7 +2442,7 @@
         </p:nvSpPr>
         <p:spPr/>
         <p:txBody>
-          <a:bodyPr/>
+          <a:bodyPr numCol="1"/>
           <a:lstStyle/>
           <a:p>
             <a:fld id="{F85CA616-104E-4A84-ABF0-22257A41171C}" type="slidenum">
@@ -2489,7 +2508,7 @@
           </a:prstGeom>
         </p:spPr>
         <p:txBody>
-          <a:bodyPr vert="horz" lIns="91440" tIns="45720" rIns="91440" bIns="45720" rtlCol="0" anchor="ctr">
+          <a:bodyPr vert="horz" lIns="91440" tIns="45720" rIns="91440" bIns="45720" numCol="1" rtlCol="0" anchor="ctr">
             <a:normAutofit/>
           </a:bodyPr>
           <a:lstStyle/>
@@ -2522,7 +2541,7 @@
           </a:prstGeom>
         </p:spPr>
         <p:txBody>
-          <a:bodyPr vert="horz" lIns="91440" tIns="45720" rIns="91440" bIns="45720" rtlCol="0">
+          <a:bodyPr vert="horz" lIns="91440" tIns="45720" rIns="91440" bIns="45720" numCol="1" rtlCol="0">
             <a:normAutofit/>
           </a:bodyPr>
           <a:lstStyle/>
@@ -2584,7 +2603,7 @@
           </a:prstGeom>
         </p:spPr>
         <p:txBody>
-          <a:bodyPr vert="horz" lIns="91440" tIns="45720" rIns="91440" bIns="45720" rtlCol="0" anchor="ctr"/>
+          <a:bodyPr vert="horz" lIns="91440" tIns="45720" rIns="91440" bIns="45720" numCol="1" rtlCol="0" anchor="ctr"/>
           <a:lstStyle>
             <a:lvl1pPr algn="l">
               <a:defRPr sz="1200">
@@ -2599,7 +2618,7 @@
           <a:p>
             <a:fld id="{565AE5A7-D644-464D-B982-26090501DA72}" type="datetimeFigureOut">
               <a:rPr lang="en-US" smtClean="0"/>
-              <a:t>2/16/2017</a:t>
+              <a:t>2/20/2017</a:t>
             </a:fld>
             <a:endParaRPr lang="en-US"/>
           </a:p>
@@ -2625,7 +2644,7 @@
           </a:prstGeom>
         </p:spPr>
         <p:txBody>
-          <a:bodyPr vert="horz" lIns="91440" tIns="45720" rIns="91440" bIns="45720" rtlCol="0" anchor="ctr"/>
+          <a:bodyPr vert="horz" lIns="91440" tIns="45720" rIns="91440" bIns="45720" numCol="1" rtlCol="0" anchor="ctr"/>
           <a:lstStyle>
             <a:lvl1pPr algn="ctr">
               <a:defRPr sz="1200">
@@ -2662,7 +2681,7 @@
           </a:prstGeom>
         </p:spPr>
         <p:txBody>
-          <a:bodyPr vert="horz" lIns="91440" tIns="45720" rIns="91440" bIns="45720" rtlCol="0" anchor="ctr"/>
+          <a:bodyPr vert="horz" lIns="91440" tIns="45720" rIns="91440" bIns="45720" numCol="1" rtlCol="0" anchor="ctr"/>
           <a:lstStyle>
             <a:lvl1pPr algn="r">
               <a:defRPr sz="1200">
@@ -2692,17 +2711,17 @@
   </p:cSld>
   <p:clrMap bg1="lt1" tx1="dk1" bg2="lt2" tx2="dk2" accent1="accent1" accent2="accent2" accent3="accent3" accent4="accent4" accent5="accent5" accent6="accent6" hlink="hlink" folHlink="folHlink"/>
   <p:sldLayoutIdLst>
-    <p:sldLayoutId id="2147483649" r:id="rId1"/>
-    <p:sldLayoutId id="2147483650" r:id="rId2"/>
-    <p:sldLayoutId id="2147483651" r:id="rId3"/>
-    <p:sldLayoutId id="2147483652" r:id="rId4"/>
-    <p:sldLayoutId id="2147483653" r:id="rId5"/>
-    <p:sldLayoutId id="2147483654" r:id="rId6"/>
-    <p:sldLayoutId id="2147483655" r:id="rId7"/>
-    <p:sldLayoutId id="2147483656" r:id="rId8"/>
-    <p:sldLayoutId id="2147483657" r:id="rId9"/>
-    <p:sldLayoutId id="2147483658" r:id="rId10"/>
-    <p:sldLayoutId id="2147483659" r:id="rId11"/>
+    <p:sldLayoutId id="2147483648" r:id="rId1"/>
+    <p:sldLayoutId id="2147483649" r:id="rId2"/>
+    <p:sldLayoutId id="2147483650" r:id="rId3"/>
+    <p:sldLayoutId id="2147483651" r:id="rId4"/>
+    <p:sldLayoutId id="2147483652" r:id="rId5"/>
+    <p:sldLayoutId id="2147483653" r:id="rId6"/>
+    <p:sldLayoutId id="2147483654" r:id="rId7"/>
+    <p:sldLayoutId id="2147483655" r:id="rId8"/>
+    <p:sldLayoutId id="2147483656" r:id="rId9"/>
+    <p:sldLayoutId id="2147483657" r:id="rId10"/>
+    <p:sldLayoutId id="2147483658" r:id="rId11"/>
   </p:sldLayoutIdLst>
   <p:txStyles>
     <p:titleStyle>
@@ -3016,12 +3035,12 @@
         </p:nvSpPr>
         <p:spPr/>
         <p:txBody>
-          <a:bodyPr/>
+          <a:bodyPr numCol="1"/>
           <a:lstStyle/>
           <a:p>
             <a:r>
               <a:rPr lang="en-US" dirty="0" smtClean="0"/>
-              <a:t>ARUS 280 HW #4</a:t>
+              <a:t>ARUS 280 HW #6</a:t>
             </a:r>
             <a:endParaRPr lang="en-US" dirty="0"/>
           </a:p>
@@ -3039,12 +3058,12 @@
         </p:nvSpPr>
         <p:spPr>
           <a:xfrm>
-            <a:off x="1524000" y="3602037"/>
-            <a:ext cx="9144000" cy="2228607"/>
+            <a:off x="1537153" y="3549425"/>
+            <a:ext cx="9144000" cy="2228552"/>
           </a:xfrm>
         </p:spPr>
         <p:txBody>
-          <a:bodyPr>
+          <a:bodyPr numCol="1">
             <a:normAutofit/>
           </a:bodyPr>
           <a:lstStyle/>
@@ -3144,7 +3163,7 @@
           </a:xfrm>
         </p:spPr>
         <p:txBody>
-          <a:bodyPr>
+          <a:bodyPr numCol="1">
             <a:normAutofit/>
           </a:bodyPr>
           <a:lstStyle/>
@@ -3248,7 +3267,7 @@
           </a:xfrm>
         </p:spPr>
         <p:txBody>
-          <a:bodyPr>
+          <a:bodyPr numCol="1">
             <a:normAutofit/>
           </a:bodyPr>
           <a:lstStyle/>
@@ -3355,7 +3374,7 @@
           </a:xfrm>
         </p:spPr>
         <p:txBody>
-          <a:bodyPr>
+          <a:bodyPr numCol="1">
             <a:normAutofit/>
           </a:bodyPr>
           <a:lstStyle/>
@@ -3463,7 +3482,7 @@
           </a:xfrm>
         </p:spPr>
         <p:txBody>
-          <a:bodyPr>
+          <a:bodyPr numCol="1">
             <a:normAutofit/>
           </a:bodyPr>
           <a:lstStyle/>
@@ -3565,7 +3584,7 @@
           </a:xfrm>
         </p:spPr>
         <p:txBody>
-          <a:bodyPr>
+          <a:bodyPr numCol="1">
             <a:normAutofit/>
           </a:bodyPr>
           <a:lstStyle/>
@@ -3677,7 +3696,7 @@
           </a:xfrm>
         </p:spPr>
         <p:txBody>
-          <a:bodyPr>
+          <a:bodyPr numCol="1">
             <a:normAutofit/>
           </a:bodyPr>
           <a:lstStyle/>
@@ -3794,7 +3813,7 @@
           </a:xfrm>
         </p:spPr>
         <p:txBody>
-          <a:bodyPr>
+          <a:bodyPr numCol="1">
             <a:normAutofit/>
           </a:bodyPr>
           <a:lstStyle/>
@@ -3896,7 +3915,7 @@
           </a:xfrm>
         </p:spPr>
         <p:txBody>
-          <a:bodyPr>
+          <a:bodyPr numCol="1">
             <a:normAutofit/>
           </a:bodyPr>
           <a:lstStyle/>
@@ -3990,7 +4009,7 @@
           </a:xfrm>
         </p:spPr>
         <p:txBody>
-          <a:bodyPr>
+          <a:bodyPr numCol="1">
             <a:normAutofit/>
           </a:bodyPr>
           <a:lstStyle/>
@@ -4094,7 +4113,7 @@
           </a:xfrm>
         </p:spPr>
         <p:txBody>
-          <a:bodyPr>
+          <a:bodyPr numCol="1">
             <a:normAutofit/>
           </a:bodyPr>
           <a:lstStyle/>
@@ -4181,7 +4200,7 @@
         </p:nvSpPr>
         <p:spPr/>
         <p:txBody>
-          <a:bodyPr/>
+          <a:bodyPr numCol="1"/>
           <a:lstStyle/>
           <a:p>
             <a:r>
@@ -4204,7 +4223,7 @@
         </p:nvSpPr>
         <p:spPr/>
         <p:txBody>
-          <a:bodyPr/>
+          <a:bodyPr numCol="1"/>
           <a:lstStyle/>
           <a:p>
             <a:r>
@@ -4262,7 +4281,7 @@
           </a:xfrm>
         </p:spPr>
         <p:txBody>
-          <a:bodyPr>
+          <a:bodyPr numCol="1">
             <a:normAutofit/>
           </a:bodyPr>
           <a:lstStyle/>
@@ -4372,7 +4391,7 @@
           </a:xfrm>
         </p:spPr>
         <p:txBody>
-          <a:bodyPr>
+          <a:bodyPr numCol="1">
             <a:normAutofit/>
           </a:bodyPr>
           <a:lstStyle/>
@@ -4470,7 +4489,7 @@
         </p:nvSpPr>
         <p:spPr/>
         <p:txBody>
-          <a:bodyPr/>
+          <a:bodyPr numCol="1"/>
           <a:lstStyle/>
           <a:p>
             <a:r>
@@ -4492,7 +4511,7 @@
         </p:nvSpPr>
         <p:spPr/>
         <p:txBody>
-          <a:bodyPr/>
+          <a:bodyPr numCol="1"/>
           <a:lstStyle/>
           <a:p>
             <a:r>
@@ -4550,7 +4569,7 @@
           </a:xfrm>
         </p:spPr>
         <p:txBody>
-          <a:bodyPr>
+          <a:bodyPr numCol="1">
             <a:normAutofit/>
           </a:bodyPr>
           <a:lstStyle/>
@@ -4636,7 +4655,7 @@
           </a:xfrm>
         </p:spPr>
         <p:txBody>
-          <a:bodyPr>
+          <a:bodyPr numCol="1">
             <a:normAutofit/>
           </a:bodyPr>
           <a:lstStyle/>
@@ -4758,7 +4777,7 @@
           </a:xfrm>
         </p:spPr>
         <p:txBody>
-          <a:bodyPr>
+          <a:bodyPr numCol="1">
             <a:normAutofit/>
           </a:bodyPr>
           <a:lstStyle/>
@@ -4858,7 +4877,7 @@
           </a:xfrm>
         </p:spPr>
         <p:txBody>
-          <a:bodyPr>
+          <a:bodyPr numCol="1">
             <a:normAutofit/>
           </a:bodyPr>
           <a:lstStyle/>
@@ -5020,7 +5039,7 @@
           </a:xfrm>
         </p:spPr>
         <p:txBody>
-          <a:bodyPr>
+          <a:bodyPr numCol="1">
             <a:normAutofit/>
           </a:bodyPr>
           <a:lstStyle/>
@@ -5111,7 +5130,7 @@
           </a:xfrm>
         </p:spPr>
         <p:txBody>
-          <a:bodyPr/>
+          <a:bodyPr numCol="1"/>
           <a:lstStyle/>
           <a:p>
             <a:r>
@@ -5133,7 +5152,7 @@
         </p:nvSpPr>
         <p:spPr/>
         <p:txBody>
-          <a:bodyPr/>
+          <a:bodyPr numCol="1"/>
           <a:lstStyle/>
           <a:p>
             <a:r>
@@ -5191,7 +5210,7 @@
           </a:xfrm>
         </p:spPr>
         <p:txBody>
-          <a:bodyPr>
+          <a:bodyPr numCol="1">
             <a:normAutofit/>
           </a:bodyPr>
           <a:lstStyle/>
@@ -5276,7 +5295,7 @@
           </a:xfrm>
         </p:spPr>
         <p:txBody>
-          <a:bodyPr/>
+          <a:bodyPr numCol="1"/>
           <a:lstStyle/>
           <a:p>
             <a:r>
@@ -5383,7 +5402,7 @@
           </a:xfrm>
         </p:spPr>
         <p:txBody>
-          <a:bodyPr>
+          <a:bodyPr numCol="1">
             <a:normAutofit/>
           </a:bodyPr>
           <a:lstStyle/>
@@ -5497,7 +5516,7 @@
           </a:xfrm>
         </p:spPr>
         <p:txBody>
-          <a:bodyPr>
+          <a:bodyPr numCol="1">
             <a:normAutofit/>
           </a:bodyPr>
           <a:lstStyle/>
@@ -5522,11 +5541,7 @@
             </a:r>
             <a:r>
               <a:rPr lang="en-US" sz="3200" dirty="0" smtClean="0"/>
-              <a:t> all potentials of the </a:t>
-            </a:r>
-            <a:r>
-              <a:rPr lang="en-US" sz="3200" dirty="0" smtClean="0"/>
-              <a:t>arts</a:t>
+              <a:t> all potentials of the arts</a:t>
             </a:r>
             <a:endParaRPr lang="en-US" dirty="0"/>
           </a:p>
@@ -5586,7 +5601,6 @@
               <a:rPr lang="en-US" sz="3200" dirty="0" smtClean="0"/>
               <a:t> language of logic and language of images, movies had to make sense</a:t>
             </a:r>
-            <a:endParaRPr lang="en-US" sz="3200" dirty="0" smtClean="0"/>
           </a:p>
         </p:txBody>
       </p:sp>
@@ -5637,22 +5651,14 @@
           </a:xfrm>
         </p:spPr>
         <p:txBody>
-          <a:bodyPr>
+          <a:bodyPr numCol="1">
             <a:normAutofit/>
           </a:bodyPr>
           <a:lstStyle/>
           <a:p>
             <a:r>
               <a:rPr lang="en-US" sz="3200" dirty="0" smtClean="0"/>
-              <a:t>P </a:t>
-            </a:r>
-            <a:r>
-              <a:rPr lang="en-US" sz="3200" dirty="0" smtClean="0"/>
-              <a:t> 8 (pdf</a:t>
-            </a:r>
-            <a:r>
-              <a:rPr lang="en-US" sz="3200" dirty="0" smtClean="0"/>
-              <a:t>)</a:t>
+              <a:t>P  8 (pdf)</a:t>
             </a:r>
           </a:p>
           <a:p>
@@ -5718,13 +5724,8 @@
             </a:r>
             <a:r>
               <a:rPr lang="en-US" sz="3200" dirty="0" smtClean="0"/>
-              <a:t>. </a:t>
-            </a:r>
-            <a:r>
-              <a:rPr lang="en-US" sz="3200" dirty="0" smtClean="0"/>
-              <a:t>has an off screen narrator speak while someone acts out the scene</a:t>
-            </a:r>
-            <a:endParaRPr lang="en-US" sz="3200" dirty="0" smtClean="0"/>
+              <a:t>. has an off screen narrator speak while someone acts out the scene</a:t>
+            </a:r>
           </a:p>
         </p:txBody>
       </p:sp>
@@ -5775,22 +5776,14 @@
           </a:xfrm>
         </p:spPr>
         <p:txBody>
-          <a:bodyPr>
+          <a:bodyPr numCol="1">
             <a:normAutofit/>
           </a:bodyPr>
           <a:lstStyle/>
           <a:p>
             <a:r>
               <a:rPr lang="en-US" sz="3200" dirty="0" smtClean="0"/>
-              <a:t>P </a:t>
-            </a:r>
-            <a:r>
-              <a:rPr lang="en-US" sz="3200" dirty="0" smtClean="0"/>
-              <a:t> 9 (pdf</a:t>
-            </a:r>
-            <a:r>
-              <a:rPr lang="en-US" sz="3200" dirty="0" smtClean="0"/>
-              <a:t>)</a:t>
+              <a:t>P  9 (pdf)</a:t>
             </a:r>
           </a:p>
           <a:p>
@@ -5888,22 +5881,14 @@
           </a:xfrm>
         </p:spPr>
         <p:txBody>
-          <a:bodyPr>
+          <a:bodyPr numCol="1">
             <a:normAutofit/>
           </a:bodyPr>
           <a:lstStyle/>
           <a:p>
             <a:r>
               <a:rPr lang="en-US" sz="3200" dirty="0" smtClean="0"/>
-              <a:t>P </a:t>
-            </a:r>
-            <a:r>
-              <a:rPr lang="en-US" sz="3200" dirty="0" smtClean="0"/>
-              <a:t> 10 (pdf</a:t>
-            </a:r>
-            <a:r>
-              <a:rPr lang="en-US" sz="3200" dirty="0" smtClean="0"/>
-              <a:t>)</a:t>
+              <a:t>P  10 (pdf)</a:t>
             </a:r>
           </a:p>
           <a:p>
@@ -5946,7 +5931,6 @@
               <a:rPr lang="en-US" sz="3200" dirty="0" smtClean="0"/>
               <a:t> and acted like their respective animals</a:t>
             </a:r>
-            <a:endParaRPr lang="en-US" sz="3200" dirty="0" smtClean="0"/>
           </a:p>
         </p:txBody>
       </p:sp>
@@ -5997,22 +5981,14 @@
           </a:xfrm>
         </p:spPr>
         <p:txBody>
-          <a:bodyPr>
+          <a:bodyPr numCol="1">
             <a:normAutofit/>
           </a:bodyPr>
           <a:lstStyle/>
           <a:p>
             <a:r>
               <a:rPr lang="en-US" sz="3200" dirty="0" smtClean="0"/>
-              <a:t>P </a:t>
-            </a:r>
-            <a:r>
-              <a:rPr lang="en-US" sz="3200" dirty="0" smtClean="0"/>
-              <a:t> 11 (pdf</a:t>
-            </a:r>
-            <a:r>
-              <a:rPr lang="en-US" sz="3200" dirty="0" smtClean="0"/>
-              <a:t>)</a:t>
+              <a:t>P  11 (pdf)</a:t>
             </a:r>
           </a:p>
           <a:p>
@@ -6102,29 +6078,357 @@
           </a:xfrm>
         </p:spPr>
         <p:txBody>
-          <a:bodyPr>
+          <a:bodyPr numCol="1">
             <a:normAutofit/>
           </a:bodyPr>
           <a:lstStyle/>
           <a:p>
             <a:r>
               <a:rPr lang="en-US" sz="3200" dirty="0" smtClean="0"/>
-              <a:t>P </a:t>
-            </a:r>
-            <a:r>
-              <a:rPr lang="en-US" sz="3200" dirty="0" smtClean="0"/>
-              <a:t> 12 (pdf</a:t>
-            </a:r>
-            <a:r>
-              <a:rPr lang="en-US" sz="3200" dirty="0" smtClean="0"/>
-              <a:t>)</a:t>
-            </a:r>
-          </a:p>
-          <a:p>
-            <a:r>
-              <a:rPr lang="en-US" sz="3200" dirty="0" smtClean="0"/>
+              <a:t>P  12 (pdf)</a:t>
+            </a:r>
+          </a:p>
+          <a:p>
+            <a:r>
+              <a:rPr sz="3200">
+                <a:solidFill>
+                  <a:schemeClr val="tx1"/>
+                </a:solidFill>
+                <a:latin typeface="+mn-lt"/>
+              </a:rPr>
               <a:t>Gestures are important</a:t>
             </a:r>
+            <a:endParaRPr lang="en-US" sz="3200" dirty="0" smtClean="0"/>
+          </a:p>
+          <a:p>
+            <a:r>
+              <a:rPr lang="en-US" sz="3200" dirty="0" smtClean="0"/>
+              <a:t>Colors have no meaning, just conceptuality and they help make movies look good</a:t>
+            </a:r>
+          </a:p>
+          <a:p>
+            <a:endParaRPr lang="en-US" sz="3200" dirty="0" smtClean="0"/>
+          </a:p>
+          <a:p>
+            <a:endParaRPr lang="en-US" sz="3200" dirty="0" smtClean="0"/>
+          </a:p>
+          <a:p>
+            <a:endParaRPr lang="en-US" sz="3200" dirty="0" smtClean="0"/>
+          </a:p>
+        </p:txBody>
+      </p:sp>
+    </p:spTree>
+    <p:extLst>
+      <p:ext uri="{BB962C8B-B14F-4D97-AF65-F5344CB8AC3E}">
+        <p14:creationId xmlns:p14="http://schemas.microsoft.com/office/powerpoint/2010/main" val="1245892544"/>
+      </p:ext>
+    </p:extLst>
+  </p:cSld>
+  <p:clrMapOvr>
+    <a:masterClrMapping/>
+  </p:clrMapOvr>
+</p:sld>
+</file>
+
+<file path=ppt/slides/slide37.xml><?xml version="1.0" encoding="utf-8"?>
+<p:sld xmlns:a="http://schemas.openxmlformats.org/drawingml/2006/main" xmlns:r="http://schemas.openxmlformats.org/officeDocument/2006/relationships" xmlns:p="http://schemas.openxmlformats.org/presentationml/2006/main">
+  <p:cSld>
+    <p:spTree>
+      <p:nvGrpSpPr>
+        <p:cNvPr id="1" name=""/>
+        <p:cNvGrpSpPr/>
+        <p:nvPr/>
+      </p:nvGrpSpPr>
+      <p:grpSpPr>
+        <a:xfrm>
+          <a:off x="0" y="0"/>
+          <a:ext cx="0" cy="0"/>
+          <a:chOff x="0" y="0"/>
+          <a:chExt cx="0" cy="0"/>
+        </a:xfrm>
+      </p:grpSpPr>
+      <p:sp>
+        <p:nvSpPr>
+          <p:cNvPr id="3" name="Content Placeholder 2"/>
+          <p:cNvSpPr>
+            <a:spLocks noGrp="1"/>
+          </p:cNvSpPr>
+          <p:nvPr>
+            <p:ph idx="1"/>
+          </p:nvPr>
+        </p:nvSpPr>
+        <p:spPr>
+          <a:xfrm>
+            <a:off x="838200" y="161365"/>
+            <a:ext cx="10515600" cy="6015598"/>
+          </a:xfrm>
+        </p:spPr>
+        <p:txBody>
+          <a:bodyPr numCol="1">
+            <a:normAutofit/>
+          </a:bodyPr>
+          <a:lstStyle/>
+          <a:p>
+            <a:r>
+              <a:rPr lang="en-US" sz="3200" dirty="0" smtClean="0"/>
+              <a:t>P  13(pdf)</a:t>
+            </a:r>
+          </a:p>
+          <a:p>
+            <a:r>
+              <a:rPr/>
+              <a:t>Colors depend on the movie to work</a:t>
+            </a:r>
+          </a:p>
+          <a:p>
+            <a:r>
+              <a:rPr/>
+              <a:t>Music used to push out gestures</a:t>
+            </a:r>
+          </a:p>
+          <a:p>
+            <a:r>
+              <a:rPr/>
+              <a:t>Uses music to express emotion</a:t>
+            </a:r>
+          </a:p>
+          <a:p>
+            <a:endParaRPr/>
+          </a:p>
+          <a:p>
+            <a:endParaRPr lang="en-US" sz="3200" dirty="0" smtClean="0"/>
+          </a:p>
+          <a:p>
+            <a:endParaRPr lang="en-US" sz="3200" dirty="0" smtClean="0"/>
+          </a:p>
+          <a:p>
+            <a:endParaRPr lang="en-US" sz="3200" dirty="0" smtClean="0"/>
+          </a:p>
+          <a:p>
+            <a:endParaRPr lang="en-US" sz="3200" dirty="0" smtClean="0"/>
+          </a:p>
+        </p:txBody>
+      </p:sp>
+    </p:spTree>
+    <p:extLst>
+      <p:ext uri="{BB962C8B-B14F-4D97-AF65-F5344CB8AC3E}">
+        <p14:creationId xmlns:p14="http://schemas.microsoft.com/office/powerpoint/2010/main" val="1245892544"/>
+      </p:ext>
+    </p:extLst>
+  </p:cSld>
+  <p:clrMapOvr>
+    <a:masterClrMapping/>
+  </p:clrMapOvr>
+</p:sld>
+</file>
+
+<file path=ppt/slides/slide38.xml><?xml version="1.0" encoding="utf-8"?>
+<p:sld xmlns:a="http://schemas.openxmlformats.org/drawingml/2006/main" xmlns:r="http://schemas.openxmlformats.org/officeDocument/2006/relationships" xmlns:p="http://schemas.openxmlformats.org/presentationml/2006/main">
+  <p:cSld>
+    <p:spTree>
+      <p:nvGrpSpPr>
+        <p:cNvPr id="1" name=""/>
+        <p:cNvGrpSpPr/>
+        <p:nvPr/>
+      </p:nvGrpSpPr>
+      <p:grpSpPr>
+        <a:xfrm>
+          <a:off x="0" y="0"/>
+          <a:ext cx="0" cy="0"/>
+          <a:chOff x="0" y="0"/>
+          <a:chExt cx="0" cy="0"/>
+        </a:xfrm>
+      </p:grpSpPr>
+      <p:sp>
+        <p:nvSpPr>
+          <p:cNvPr id="3" name="Content Placeholder 2"/>
+          <p:cNvSpPr>
+            <a:spLocks noGrp="1"/>
+          </p:cNvSpPr>
+          <p:nvPr>
+            <p:ph idx="1"/>
+          </p:nvPr>
+        </p:nvSpPr>
+        <p:spPr>
+          <a:xfrm>
+            <a:off x="838200" y="161365"/>
+            <a:ext cx="10515600" cy="6015598"/>
+          </a:xfrm>
+        </p:spPr>
+        <p:txBody>
+          <a:bodyPr numCol="1">
+            <a:normAutofit/>
+          </a:bodyPr>
+          <a:lstStyle/>
+          <a:p>
+            <a:r>
+              <a:rPr lang="en-US" sz="3200" dirty="0" smtClean="0"/>
+              <a:t>P  14(pdf)</a:t>
+            </a:r>
+          </a:p>
+          <a:p>
+            <a:r>
+              <a:rPr sz="3200">
+                <a:solidFill>
+                  <a:schemeClr val="tx1"/>
+                </a:solidFill>
+                <a:latin typeface="+mn-lt"/>
+              </a:rPr>
+              <a:t>Eisen makes his music clash, like like yin and yang</a:t>
+            </a:r>
+          </a:p>
+          <a:p>
+            <a:r>
+              <a:rPr sz="3200">
+                <a:solidFill>
+                  <a:schemeClr val="tx1"/>
+                </a:solidFill>
+                <a:latin typeface="+mn-lt"/>
+              </a:rPr>
+              <a:t>Music should signify something to the audience</a:t>
+            </a:r>
+          </a:p>
+          <a:p>
+            <a:r>
+              <a:rPr sz="3000"/>
+              <a:t>I dont get this paragrahph at all (p 3)</a:t>
+            </a:r>
+          </a:p>
+          <a:p>
+            <a:r>
+              <a:rPr sz="3000"/>
+              <a:t>Cinematic art works by telling u its real and fake at the same time</a:t>
+            </a:r>
+          </a:p>
+          <a:p>
+            <a:r>
+              <a:rPr/>
+              <a:t>Everything in Eisen. work is overlapping</a:t>
+            </a:r>
+          </a:p>
+          <a:p>
+            <a:endParaRPr/>
+          </a:p>
+          <a:p>
+            <a:endParaRPr/>
+          </a:p>
+          <a:p>
+            <a:endParaRPr lang="en-US" sz="3200" dirty="0" smtClean="0"/>
+          </a:p>
+          <a:p>
+            <a:endParaRPr lang="en-US" sz="3200" dirty="0" smtClean="0"/>
+          </a:p>
+          <a:p>
+            <a:endParaRPr lang="en-US" sz="3200" dirty="0" smtClean="0"/>
+          </a:p>
+          <a:p>
+            <a:endParaRPr lang="en-US" sz="3200" dirty="0" smtClean="0"/>
+          </a:p>
+        </p:txBody>
+      </p:sp>
+    </p:spTree>
+    <p:extLst>
+      <p:ext uri="{BB962C8B-B14F-4D97-AF65-F5344CB8AC3E}">
+        <p14:creationId xmlns:p14="http://schemas.microsoft.com/office/powerpoint/2010/main" val="1245892544"/>
+      </p:ext>
+    </p:extLst>
+  </p:cSld>
+  <p:clrMapOvr>
+    <a:masterClrMapping/>
+  </p:clrMapOvr>
+</p:sld>
+</file>
+
+<file path=ppt/slides/slide39.xml><?xml version="1.0" encoding="utf-8"?>
+<p:sld xmlns:a="http://schemas.openxmlformats.org/drawingml/2006/main" xmlns:r="http://schemas.openxmlformats.org/officeDocument/2006/relationships" xmlns:p="http://schemas.openxmlformats.org/presentationml/2006/main">
+  <p:cSld>
+    <p:spTree>
+      <p:nvGrpSpPr>
+        <p:cNvPr id="1" name=""/>
+        <p:cNvGrpSpPr/>
+        <p:nvPr/>
+      </p:nvGrpSpPr>
+      <p:grpSpPr>
+        <a:xfrm>
+          <a:off x="0" y="0"/>
+          <a:ext cx="0" cy="0"/>
+          <a:chOff x="0" y="0"/>
+          <a:chExt cx="0" cy="0"/>
+        </a:xfrm>
+      </p:grpSpPr>
+      <p:sp>
+        <p:nvSpPr>
+          <p:cNvPr id="3" name="Content Placeholder 2"/>
+          <p:cNvSpPr>
+            <a:spLocks noGrp="1"/>
+          </p:cNvSpPr>
+          <p:nvPr>
+            <p:ph idx="1"/>
+          </p:nvPr>
+        </p:nvSpPr>
+        <p:spPr>
+          <a:xfrm>
+            <a:off x="838200" y="161365"/>
+            <a:ext cx="10515600" cy="6015598"/>
+          </a:xfrm>
+        </p:spPr>
+        <p:txBody>
+          <a:bodyPr numCol="1">
+            <a:normAutofit/>
+          </a:bodyPr>
+          <a:lstStyle/>
+          <a:p>
+            <a:r>
+              <a:rPr lang="en-US" sz="3200" dirty="0" smtClean="0"/>
+              <a:t>P  15(pdf)</a:t>
+            </a:r>
+          </a:p>
+          <a:p>
+            <a:r>
+              <a:rPr/>
+              <a:t>His work is ultimately dynamic</a:t>
+            </a:r>
+          </a:p>
+          <a:p>
+            <a:r>
+              <a:rPr/>
+              <a:t>Cinema is living</a:t>
+            </a:r>
+          </a:p>
+          <a:p>
+            <a:r>
+              <a:rPr/>
+              <a:t>People gotta enjoy the movie</a:t>
+            </a:r>
+          </a:p>
+          <a:p>
+            <a:r>
+              <a:rPr/>
+              <a:t>As people watch, they also make the image for theirselves, their own personal way of how they see things</a:t>
+            </a:r>
+          </a:p>
+          <a:p>
+            <a:endParaRPr/>
+          </a:p>
+          <a:p>
+            <a:endParaRPr/>
+          </a:p>
+          <a:p>
+            <a:endParaRPr/>
+          </a:p>
+          <a:p>
+            <a:endParaRPr/>
+          </a:p>
+          <a:p>
+            <a:endParaRPr lang="en-US" sz="3200" dirty="0" smtClean="0"/>
+          </a:p>
+          <a:p>
+            <a:endParaRPr lang="en-US" sz="3200" dirty="0" smtClean="0"/>
+          </a:p>
+          <a:p>
+            <a:endParaRPr lang="en-US" sz="3200" dirty="0" smtClean="0"/>
+          </a:p>
+          <a:p>
             <a:endParaRPr lang="en-US" sz="3200" dirty="0" smtClean="0"/>
           </a:p>
         </p:txBody>
@@ -6176,7 +6480,7 @@
           </a:xfrm>
         </p:spPr>
         <p:txBody>
-          <a:bodyPr/>
+          <a:bodyPr numCol="1"/>
           <a:lstStyle/>
           <a:p>
             <a:r>
@@ -6278,6 +6582,1134 @@
     <p:extLst>
       <p:ext uri="{BB962C8B-B14F-4D97-AF65-F5344CB8AC3E}">
         <p14:creationId xmlns:p14="http://schemas.microsoft.com/office/powerpoint/2010/main" val="4138976083"/>
+      </p:ext>
+    </p:extLst>
+  </p:cSld>
+  <p:clrMapOvr>
+    <a:masterClrMapping/>
+  </p:clrMapOvr>
+</p:sld>
+</file>
+
+<file path=ppt/slides/slide40.xml><?xml version="1.0" encoding="utf-8"?>
+<p:sld xmlns:a="http://schemas.openxmlformats.org/drawingml/2006/main" xmlns:r="http://schemas.openxmlformats.org/officeDocument/2006/relationships" xmlns:p="http://schemas.openxmlformats.org/presentationml/2006/main">
+  <p:cSld>
+    <p:spTree>
+      <p:nvGrpSpPr>
+        <p:cNvPr id="1" name=""/>
+        <p:cNvGrpSpPr/>
+        <p:nvPr/>
+      </p:nvGrpSpPr>
+      <p:grpSpPr>
+        <a:xfrm>
+          <a:off x="0" y="0"/>
+          <a:ext cx="0" cy="0"/>
+          <a:chOff x="0" y="0"/>
+          <a:chExt cx="0" cy="0"/>
+        </a:xfrm>
+      </p:grpSpPr>
+      <p:sp>
+        <p:nvSpPr>
+          <p:cNvPr id="3" name="Content Placeholder 2"/>
+          <p:cNvSpPr>
+            <a:spLocks noGrp="1"/>
+          </p:cNvSpPr>
+          <p:nvPr>
+            <p:ph idx="1"/>
+          </p:nvPr>
+        </p:nvSpPr>
+        <p:spPr>
+          <a:xfrm>
+            <a:off x="838200" y="161365"/>
+            <a:ext cx="10515600" cy="6015598"/>
+          </a:xfrm>
+        </p:spPr>
+        <p:txBody>
+          <a:bodyPr numCol="1">
+            <a:normAutofit/>
+          </a:bodyPr>
+          <a:lstStyle/>
+          <a:p>
+            <a:r>
+              <a:rPr lang="en-US" sz="3200" dirty="0" smtClean="0"/>
+              <a:t>P  16(pdf)</a:t>
+            </a:r>
+          </a:p>
+          <a:p>
+            <a:r>
+              <a:rPr/>
+              <a:t>There is norms and deviation in movies</a:t>
+            </a:r>
+          </a:p>
+          <a:p>
+            <a:r>
+              <a:rPr/>
+              <a:t>Idk I think it talks abt montage</a:t>
+            </a:r>
+          </a:p>
+          <a:p>
+            <a:endParaRPr/>
+          </a:p>
+          <a:p>
+            <a:endParaRPr/>
+          </a:p>
+          <a:p>
+            <a:endParaRPr/>
+          </a:p>
+          <a:p>
+            <a:endParaRPr/>
+          </a:p>
+          <a:p>
+            <a:endParaRPr/>
+          </a:p>
+          <a:p>
+            <a:endParaRPr lang="en-US" sz="3200" dirty="0" smtClean="0"/>
+          </a:p>
+          <a:p>
+            <a:endParaRPr lang="en-US" sz="3200" dirty="0" smtClean="0"/>
+          </a:p>
+          <a:p>
+            <a:endParaRPr lang="en-US" sz="3200" dirty="0" smtClean="0"/>
+          </a:p>
+          <a:p>
+            <a:endParaRPr lang="en-US" sz="3200" dirty="0" smtClean="0"/>
+          </a:p>
+        </p:txBody>
+      </p:sp>
+    </p:spTree>
+    <p:extLst>
+      <p:ext uri="{BB962C8B-B14F-4D97-AF65-F5344CB8AC3E}">
+        <p14:creationId xmlns:p14="http://schemas.microsoft.com/office/powerpoint/2010/main" val="1245892544"/>
+      </p:ext>
+    </p:extLst>
+  </p:cSld>
+  <p:clrMapOvr>
+    <a:masterClrMapping/>
+  </p:clrMapOvr>
+</p:sld>
+</file>
+
+<file path=ppt/slides/slide41.xml><?xml version="1.0" encoding="utf-8"?>
+<p:sld xmlns:a="http://schemas.openxmlformats.org/drawingml/2006/main" xmlns:r="http://schemas.openxmlformats.org/officeDocument/2006/relationships" xmlns:p="http://schemas.openxmlformats.org/presentationml/2006/main">
+  <p:cSld>
+    <p:spTree>
+      <p:nvGrpSpPr>
+        <p:cNvPr id="1" name=""/>
+        <p:cNvGrpSpPr/>
+        <p:nvPr/>
+      </p:nvGrpSpPr>
+      <p:grpSpPr>
+        <a:xfrm>
+          <a:off x="0" y="0"/>
+          <a:ext cx="0" cy="0"/>
+          <a:chOff x="0" y="0"/>
+          <a:chExt cx="0" cy="0"/>
+        </a:xfrm>
+      </p:grpSpPr>
+      <p:sp>
+        <p:nvSpPr>
+          <p:cNvPr id="3" name="Content Placeholder 2"/>
+          <p:cNvSpPr>
+            <a:spLocks noGrp="1"/>
+          </p:cNvSpPr>
+          <p:nvPr>
+            <p:ph idx="1"/>
+          </p:nvPr>
+        </p:nvSpPr>
+        <p:spPr>
+          <a:xfrm>
+            <a:off x="838200" y="161365"/>
+            <a:ext cx="10515600" cy="6015598"/>
+          </a:xfrm>
+        </p:spPr>
+        <p:txBody>
+          <a:bodyPr numCol="1">
+            <a:normAutofit/>
+          </a:bodyPr>
+          <a:lstStyle/>
+          <a:p>
+            <a:r>
+              <a:rPr lang="en-US" sz="3200" dirty="0" smtClean="0"/>
+              <a:t>P  17(pdf)</a:t>
+            </a:r>
+          </a:p>
+          <a:p>
+            <a:r>
+              <a:rPr/>
+              <a:t>The essence of cinema is to create meaning</a:t>
+            </a:r>
+          </a:p>
+          <a:p>
+            <a:r>
+              <a:rPr/>
+              <a:t>I think this is talking about how ppl can switch between shots in their work and take advantage of that and do different things with it</a:t>
+            </a:r>
+          </a:p>
+          <a:p>
+            <a:r>
+              <a:rPr/>
+              <a:t>Different viewpoints in conflict are also represented as dynamic</a:t>
+            </a:r>
+          </a:p>
+          <a:p>
+            <a:r>
+              <a:rPr/>
+              <a:t>Eisen calls the use of several aspects (codes) of cinema vertical montage</a:t>
+            </a:r>
+          </a:p>
+          <a:p>
+            <a:r>
+              <a:rPr/>
+              <a:t>The movie has to give credit to all the details that make it up</a:t>
+            </a:r>
+          </a:p>
+          <a:p>
+            <a:endParaRPr/>
+          </a:p>
+          <a:p>
+            <a:endParaRPr/>
+          </a:p>
+          <a:p>
+            <a:endParaRPr/>
+          </a:p>
+          <a:p>
+            <a:endParaRPr/>
+          </a:p>
+          <a:p>
+            <a:endParaRPr/>
+          </a:p>
+          <a:p>
+            <a:endParaRPr/>
+          </a:p>
+          <a:p>
+            <a:endParaRPr/>
+          </a:p>
+          <a:p>
+            <a:endParaRPr lang="en-US" sz="3200" dirty="0" smtClean="0"/>
+          </a:p>
+          <a:p>
+            <a:endParaRPr lang="en-US" sz="3200" dirty="0" smtClean="0"/>
+          </a:p>
+          <a:p>
+            <a:endParaRPr lang="en-US" sz="3200" dirty="0" smtClean="0"/>
+          </a:p>
+          <a:p>
+            <a:endParaRPr lang="en-US" sz="3200" dirty="0" smtClean="0"/>
+          </a:p>
+        </p:txBody>
+      </p:sp>
+    </p:spTree>
+    <p:extLst>
+      <p:ext uri="{BB962C8B-B14F-4D97-AF65-F5344CB8AC3E}">
+        <p14:creationId xmlns:p14="http://schemas.microsoft.com/office/powerpoint/2010/main" val="1245892544"/>
+      </p:ext>
+    </p:extLst>
+  </p:cSld>
+  <p:clrMapOvr>
+    <a:masterClrMapping/>
+  </p:clrMapOvr>
+</p:sld>
+</file>
+
+<file path=ppt/slides/slide42.xml><?xml version="1.0" encoding="utf-8"?>
+<p:sld xmlns:a="http://schemas.openxmlformats.org/drawingml/2006/main" xmlns:r="http://schemas.openxmlformats.org/officeDocument/2006/relationships" xmlns:p="http://schemas.openxmlformats.org/presentationml/2006/main">
+  <p:cSld>
+    <p:spTree>
+      <p:nvGrpSpPr>
+        <p:cNvPr id="1" name=""/>
+        <p:cNvGrpSpPr/>
+        <p:nvPr/>
+      </p:nvGrpSpPr>
+      <p:grpSpPr>
+        <a:xfrm>
+          <a:off x="0" y="0"/>
+          <a:ext cx="0" cy="0"/>
+          <a:chOff x="0" y="0"/>
+          <a:chExt cx="0" cy="0"/>
+        </a:xfrm>
+      </p:grpSpPr>
+      <p:sp>
+        <p:nvSpPr>
+          <p:cNvPr id="3" name="Content Placeholder 2"/>
+          <p:cNvSpPr>
+            <a:spLocks noGrp="1"/>
+          </p:cNvSpPr>
+          <p:nvPr>
+            <p:ph idx="1"/>
+          </p:nvPr>
+        </p:nvSpPr>
+        <p:spPr>
+          <a:xfrm>
+            <a:off x="838200" y="161365"/>
+            <a:ext cx="10515600" cy="6015598"/>
+          </a:xfrm>
+        </p:spPr>
+        <p:txBody>
+          <a:bodyPr numCol="1">
+            <a:normAutofit/>
+          </a:bodyPr>
+          <a:lstStyle/>
+          <a:p>
+            <a:r>
+              <a:rPr lang="en-US" sz="3200" dirty="0" smtClean="0"/>
+              <a:t>P  18(pdf)</a:t>
+            </a:r>
+          </a:p>
+          <a:p>
+            <a:r>
+              <a:rPr/>
+              <a:t>The vertical montage is made when you take apart details you see in real life and re-create them in your movies</a:t>
+            </a:r>
+          </a:p>
+          <a:p>
+            <a:r>
+              <a:rPr/>
+              <a:t>Thought comes after a media of communication</a:t>
+            </a:r>
+          </a:p>
+          <a:p>
+            <a:r>
+              <a:rPr/>
+              <a:t>"         "  in words</a:t>
+            </a:r>
+          </a:p>
+          <a:p>
+            <a:r>
+              <a:rPr/>
+              <a:t>"          " in a cinema</a:t>
+            </a:r>
+          </a:p>
+          <a:p>
+            <a:r>
+              <a:rPr/>
+              <a:t>"          " same w/ complex sound and pictures and combined</a:t>
+            </a:r>
+          </a:p>
+          <a:p>
+            <a:r>
+              <a:rPr/>
+              <a:t>"           " then </a:t>
+            </a:r>
+          </a:p>
+          <a:p>
+            <a:r>
+              <a:rPr/>
+              <a:t>Souds futurisitc, but its not</a:t>
+            </a:r>
+          </a:p>
+          <a:p>
+            <a:r>
+              <a:rPr/>
+              <a:t>Sassure called it syntagmatism, where complexity of elements in time</a:t>
+            </a:r>
+          </a:p>
+          <a:p>
+            <a:endParaRPr/>
+          </a:p>
+          <a:p>
+            <a:endParaRPr lang="en-US" sz="3200" dirty="0" smtClean="0"/>
+          </a:p>
+          <a:p>
+            <a:endParaRPr lang="en-US" sz="3200" dirty="0" smtClean="0"/>
+          </a:p>
+          <a:p>
+            <a:endParaRPr lang="en-US" sz="3200" dirty="0" smtClean="0"/>
+          </a:p>
+          <a:p>
+            <a:endParaRPr lang="en-US" sz="3200" dirty="0" smtClean="0"/>
+          </a:p>
+        </p:txBody>
+      </p:sp>
+    </p:spTree>
+    <p:extLst>
+      <p:ext uri="{BB962C8B-B14F-4D97-AF65-F5344CB8AC3E}">
+        <p14:creationId xmlns:p14="http://schemas.microsoft.com/office/powerpoint/2010/main" val="1245892544"/>
+      </p:ext>
+    </p:extLst>
+  </p:cSld>
+  <p:clrMapOvr>
+    <a:masterClrMapping/>
+  </p:clrMapOvr>
+</p:sld>
+</file>
+
+<file path=ppt/slides/slide43.xml><?xml version="1.0" encoding="utf-8"?>
+<p:sld xmlns:a="http://schemas.openxmlformats.org/drawingml/2006/main" xmlns:r="http://schemas.openxmlformats.org/officeDocument/2006/relationships" xmlns:p="http://schemas.openxmlformats.org/presentationml/2006/main">
+  <p:cSld>
+    <p:spTree>
+      <p:nvGrpSpPr>
+        <p:cNvPr id="1" name=""/>
+        <p:cNvGrpSpPr/>
+        <p:nvPr/>
+      </p:nvGrpSpPr>
+      <p:grpSpPr>
+        <a:xfrm>
+          <a:off x="0" y="0"/>
+          <a:ext cx="0" cy="0"/>
+          <a:chOff x="0" y="0"/>
+          <a:chExt cx="0" cy="0"/>
+        </a:xfrm>
+      </p:grpSpPr>
+      <p:sp>
+        <p:nvSpPr>
+          <p:cNvPr id="3" name="Content Placeholder 2"/>
+          <p:cNvSpPr>
+            <a:spLocks noGrp="1"/>
+          </p:cNvSpPr>
+          <p:nvPr>
+            <p:ph idx="1"/>
+          </p:nvPr>
+        </p:nvSpPr>
+        <p:spPr>
+          <a:xfrm>
+            <a:off x="838200" y="161365"/>
+            <a:ext cx="10515600" cy="6015598"/>
+          </a:xfrm>
+        </p:spPr>
+        <p:txBody>
+          <a:bodyPr numCol="1">
+            <a:normAutofit/>
+          </a:bodyPr>
+          <a:lstStyle/>
+          <a:p>
+            <a:r>
+              <a:rPr lang="en-US" sz="3200" dirty="0" smtClean="0"/>
+              <a:t>P  19(pdf)</a:t>
+            </a:r>
+          </a:p>
+          <a:p>
+            <a:r>
+              <a:rPr/>
+              <a:t>All the details depend on each other</a:t>
+            </a:r>
+          </a:p>
+          <a:p>
+            <a:r>
+              <a:rPr/>
+              <a:t>This happens at a complex level</a:t>
+            </a:r>
+          </a:p>
+          <a:p>
+            <a:r>
+              <a:rPr/>
+              <a:t>Also called Tyjanov idea of dual poetry</a:t>
+            </a:r>
+          </a:p>
+          <a:p>
+            <a:r>
+              <a:rPr/>
+              <a:t>Eisens shots are dynamic internally</a:t>
+            </a:r>
+          </a:p>
+          <a:p>
+            <a:endParaRPr lang="en-US" sz="3200" dirty="0" smtClean="0"/>
+          </a:p>
+          <a:p>
+            <a:endParaRPr lang="en-US" sz="3200" dirty="0" smtClean="0"/>
+          </a:p>
+          <a:p>
+            <a:endParaRPr lang="en-US" sz="3200" dirty="0" smtClean="0"/>
+          </a:p>
+          <a:p>
+            <a:endParaRPr lang="en-US" sz="3200" dirty="0" smtClean="0"/>
+          </a:p>
+        </p:txBody>
+      </p:sp>
+    </p:spTree>
+    <p:extLst>
+      <p:ext uri="{BB962C8B-B14F-4D97-AF65-F5344CB8AC3E}">
+        <p14:creationId xmlns:p14="http://schemas.microsoft.com/office/powerpoint/2010/main" val="1245892544"/>
+      </p:ext>
+    </p:extLst>
+  </p:cSld>
+  <p:clrMapOvr>
+    <a:masterClrMapping/>
+  </p:clrMapOvr>
+</p:sld>
+</file>
+
+<file path=ppt/slides/slide44.xml><?xml version="1.0" encoding="utf-8"?>
+<p:sld xmlns:a="http://schemas.openxmlformats.org/drawingml/2006/main" xmlns:r="http://schemas.openxmlformats.org/officeDocument/2006/relationships" xmlns:p="http://schemas.openxmlformats.org/presentationml/2006/main">
+  <p:cSld>
+    <p:spTree>
+      <p:nvGrpSpPr>
+        <p:cNvPr id="1" name=""/>
+        <p:cNvGrpSpPr/>
+        <p:nvPr/>
+      </p:nvGrpSpPr>
+      <p:grpSpPr>
+        <a:xfrm>
+          <a:off x="0" y="0"/>
+          <a:ext cx="0" cy="0"/>
+          <a:chOff x="0" y="0"/>
+          <a:chExt cx="0" cy="0"/>
+        </a:xfrm>
+      </p:grpSpPr>
+      <p:sp>
+        <p:nvSpPr>
+          <p:cNvPr id="3" name="Content Placeholder 2"/>
+          <p:cNvSpPr>
+            <a:spLocks noGrp="1"/>
+          </p:cNvSpPr>
+          <p:nvPr>
+            <p:ph idx="1"/>
+          </p:nvPr>
+        </p:nvSpPr>
+        <p:spPr>
+          <a:xfrm>
+            <a:off x="838200" y="161365"/>
+            <a:ext cx="10515600" cy="6015598"/>
+          </a:xfrm>
+        </p:spPr>
+        <p:txBody>
+          <a:bodyPr numCol="1">
+            <a:normAutofit/>
+          </a:bodyPr>
+          <a:lstStyle/>
+          <a:p>
+            <a:r>
+              <a:rPr lang="en-US" sz="3200" dirty="0" smtClean="0"/>
+              <a:t>P  20(pdf)</a:t>
+            </a:r>
+          </a:p>
+          <a:p>
+            <a:r>
+              <a:rPr sz="3200">
+                <a:solidFill>
+                  <a:schemeClr val="tx1"/>
+                </a:solidFill>
+                <a:latin typeface="+mn-lt"/>
+              </a:rPr>
+              <a:t>Eisen. uses music to start a new shot</a:t>
+            </a:r>
+          </a:p>
+          <a:p>
+            <a:r>
+              <a:rPr sz="3200">
+                <a:solidFill>
+                  <a:schemeClr val="tx1"/>
+                </a:solidFill>
+                <a:latin typeface="+mn-lt"/>
+              </a:rPr>
+              <a:t>It helps the music appear better also. </a:t>
+            </a:r>
+          </a:p>
+          <a:p>
+            <a:r>
+              <a:rPr sz="3200">
+                <a:solidFill>
+                  <a:schemeClr val="tx1"/>
+                </a:solidFill>
+                <a:latin typeface="+mn-lt"/>
+              </a:rPr>
+              <a:t>What is happening is that for visuals, a new key staff is made, making movies is like writing orchestra music.</a:t>
+            </a:r>
+          </a:p>
+          <a:p>
+            <a:r>
+              <a:rPr sz="3200">
+                <a:solidFill>
+                  <a:schemeClr val="tx1"/>
+                </a:solidFill>
+                <a:latin typeface="+mn-lt"/>
+              </a:rPr>
+              <a:t>As he continued w/ it he figured out all the complexities.</a:t>
+            </a:r>
+          </a:p>
+          <a:p>
+            <a:r>
+              <a:rPr sz="3200">
+                <a:solidFill>
+                  <a:schemeClr val="tx1"/>
+                </a:solidFill>
+                <a:latin typeface="+mn-lt"/>
+              </a:rPr>
+              <a:t>As you see the entire movie you figure out what it means. </a:t>
+            </a:r>
+          </a:p>
+          <a:p>
+            <a:r>
+              <a:rPr sz="3200">
+                <a:solidFill>
+                  <a:schemeClr val="tx1"/>
+                </a:solidFill>
+                <a:latin typeface="+mn-lt"/>
+              </a:rPr>
+              <a:t>Ex.  simple stuff is not enough to see the plot</a:t>
+            </a:r>
+          </a:p>
+          <a:p>
+            <a:r>
+              <a:rPr sz="3200">
+                <a:solidFill>
+                  <a:schemeClr val="tx1"/>
+                </a:solidFill>
+                <a:latin typeface="+mn-lt"/>
+              </a:rPr>
+              <a:t>Detials in movies work like a main character, (foggy), then secondary</a:t>
+            </a:r>
+          </a:p>
+          <a:p>
+            <a:endParaRPr sz="3200">
+              <a:solidFill>
+                <a:schemeClr val="tx1"/>
+              </a:solidFill>
+              <a:latin typeface="+mn-lt"/>
+            </a:endParaRPr>
+          </a:p>
+          <a:p>
+            <a:endParaRPr lang="en-US" sz="3200" dirty="0" smtClean="0"/>
+          </a:p>
+          <a:p>
+            <a:endParaRPr lang="en-US" sz="3200" dirty="0" smtClean="0"/>
+          </a:p>
+          <a:p>
+            <a:endParaRPr lang="en-US" sz="3200" dirty="0" smtClean="0"/>
+          </a:p>
+          <a:p>
+            <a:endParaRPr lang="en-US" sz="3200" dirty="0" smtClean="0"/>
+          </a:p>
+        </p:txBody>
+      </p:sp>
+    </p:spTree>
+    <p:extLst>
+      <p:ext uri="{BB962C8B-B14F-4D97-AF65-F5344CB8AC3E}">
+        <p14:creationId xmlns:p14="http://schemas.microsoft.com/office/powerpoint/2010/main" val="1245892544"/>
+      </p:ext>
+    </p:extLst>
+  </p:cSld>
+  <p:clrMapOvr>
+    <a:masterClrMapping/>
+  </p:clrMapOvr>
+</p:sld>
+</file>
+
+<file path=ppt/slides/slide45.xml><?xml version="1.0" encoding="utf-8"?>
+<p:sld xmlns:a="http://schemas.openxmlformats.org/drawingml/2006/main" xmlns:r="http://schemas.openxmlformats.org/officeDocument/2006/relationships" xmlns:p="http://schemas.openxmlformats.org/presentationml/2006/main">
+  <p:cSld>
+    <p:spTree>
+      <p:nvGrpSpPr>
+        <p:cNvPr id="1" name=""/>
+        <p:cNvGrpSpPr/>
+        <p:nvPr/>
+      </p:nvGrpSpPr>
+      <p:grpSpPr>
+        <a:xfrm>
+          <a:off x="0" y="0"/>
+          <a:ext cx="0" cy="0"/>
+          <a:chOff x="0" y="0"/>
+          <a:chExt cx="0" cy="0"/>
+        </a:xfrm>
+      </p:grpSpPr>
+      <p:sp>
+        <p:nvSpPr>
+          <p:cNvPr id="3" name="Content Placeholder 2"/>
+          <p:cNvSpPr>
+            <a:spLocks noGrp="1"/>
+          </p:cNvSpPr>
+          <p:nvPr>
+            <p:ph idx="1"/>
+          </p:nvPr>
+        </p:nvSpPr>
+        <p:spPr>
+          <a:xfrm>
+            <a:off x="838200" y="161365"/>
+            <a:ext cx="10515600" cy="6015598"/>
+          </a:xfrm>
+        </p:spPr>
+        <p:txBody>
+          <a:bodyPr numCol="1">
+            <a:normAutofit/>
+          </a:bodyPr>
+          <a:lstStyle/>
+          <a:p>
+            <a:r>
+              <a:rPr lang="en-US" sz="3200" dirty="0" smtClean="0"/>
+              <a:t>P  21(pdf)</a:t>
+            </a:r>
+          </a:p>
+          <a:p>
+            <a:r>
+              <a:rPr sz="3200">
+                <a:solidFill>
+                  <a:schemeClr val="tx1"/>
+                </a:solidFill>
+                <a:latin typeface="+mn-lt"/>
+              </a:rPr>
+              <a:t>Details in movies work like a main character, (foggy), then secondary characters (rippling waves) to adjust it. </a:t>
+            </a:r>
+          </a:p>
+          <a:p>
+            <a:r>
+              <a:rPr sz="3200">
+                <a:solidFill>
+                  <a:schemeClr val="tx1"/>
+                </a:solidFill>
+                <a:latin typeface="+mn-lt"/>
+              </a:rPr>
+              <a:t>Instead of having ppl killed, we should see why ppl are getting killed, revolt, call to war etc.</a:t>
+            </a:r>
+          </a:p>
+          <a:p>
+            <a:r>
+              <a:rPr sz="3200">
+                <a:solidFill>
+                  <a:schemeClr val="tx1"/>
+                </a:solidFill>
+                <a:latin typeface="+mn-lt"/>
+              </a:rPr>
+              <a:t>Vertical montage works with paradigms, and semiotics to create  not only living, but beautiful movies</a:t>
+            </a:r>
+          </a:p>
+          <a:p>
+            <a:endParaRPr sz="3200">
+              <a:solidFill>
+                <a:schemeClr val="tx1"/>
+              </a:solidFill>
+              <a:latin typeface="+mn-lt"/>
+            </a:endParaRPr>
+          </a:p>
+          <a:p>
+            <a:endParaRPr lang="en-US" sz="3200" dirty="0" smtClean="0"/>
+          </a:p>
+          <a:p>
+            <a:endParaRPr lang="en-US" sz="3200" dirty="0" smtClean="0"/>
+          </a:p>
+          <a:p>
+            <a:endParaRPr lang="en-US" sz="3200" dirty="0" smtClean="0"/>
+          </a:p>
+          <a:p>
+            <a:endParaRPr lang="en-US" sz="3200" dirty="0" smtClean="0"/>
+          </a:p>
+        </p:txBody>
+      </p:sp>
+    </p:spTree>
+    <p:extLst>
+      <p:ext uri="{BB962C8B-B14F-4D97-AF65-F5344CB8AC3E}">
+        <p14:creationId xmlns:p14="http://schemas.microsoft.com/office/powerpoint/2010/main" val="1245892544"/>
+      </p:ext>
+    </p:extLst>
+  </p:cSld>
+  <p:clrMapOvr>
+    <a:masterClrMapping/>
+  </p:clrMapOvr>
+</p:sld>
+</file>
+
+<file path=ppt/slides/slide46.xml><?xml version="1.0" encoding="utf-8"?>
+<p:sld xmlns:a="http://schemas.openxmlformats.org/drawingml/2006/main" xmlns:r="http://schemas.openxmlformats.org/officeDocument/2006/relationships" xmlns:p="http://schemas.openxmlformats.org/presentationml/2006/main">
+  <p:cSld>
+    <p:spTree>
+      <p:nvGrpSpPr>
+        <p:cNvPr id="1" name=""/>
+        <p:cNvGrpSpPr/>
+        <p:nvPr/>
+      </p:nvGrpSpPr>
+      <p:grpSpPr>
+        <a:xfrm>
+          <a:off x="0" y="0"/>
+          <a:ext cx="0" cy="0"/>
+          <a:chOff x="0" y="0"/>
+          <a:chExt cx="0" cy="0"/>
+        </a:xfrm>
+      </p:grpSpPr>
+      <p:sp>
+        <p:nvSpPr>
+          <p:cNvPr id="3" name="Content Placeholder 2"/>
+          <p:cNvSpPr>
+            <a:spLocks noGrp="1"/>
+          </p:cNvSpPr>
+          <p:nvPr>
+            <p:ph idx="1"/>
+          </p:nvPr>
+        </p:nvSpPr>
+        <p:spPr>
+          <a:xfrm>
+            <a:off x="838200" y="161365"/>
+            <a:ext cx="10515600" cy="6015598"/>
+          </a:xfrm>
+        </p:spPr>
+        <p:txBody>
+          <a:bodyPr numCol="1">
+            <a:normAutofit/>
+          </a:bodyPr>
+          <a:lstStyle/>
+          <a:p>
+            <a:r>
+              <a:rPr lang="en-US" sz="3200" dirty="0" smtClean="0"/>
+              <a:t>P  22(pdf)</a:t>
+            </a:r>
+          </a:p>
+          <a:p>
+            <a:r>
+              <a:rPr sz="3200">
+                <a:solidFill>
+                  <a:schemeClr val="tx1"/>
+                </a:solidFill>
+                <a:latin typeface="+mn-lt"/>
+              </a:rPr>
+              <a:t>Because of Eisen we can better study semiotics</a:t>
+            </a:r>
+          </a:p>
+          <a:p>
+            <a:endParaRPr sz="3200">
+              <a:solidFill>
+                <a:schemeClr val="tx1"/>
+              </a:solidFill>
+              <a:latin typeface="+mn-lt"/>
+            </a:endParaRPr>
+          </a:p>
+          <a:p>
+            <a:endParaRPr lang="en-US" sz="3200" dirty="0" smtClean="0"/>
+          </a:p>
+          <a:p>
+            <a:endParaRPr lang="en-US" sz="3200" dirty="0" smtClean="0"/>
+          </a:p>
+          <a:p>
+            <a:endParaRPr lang="en-US" sz="3200" dirty="0" smtClean="0"/>
+          </a:p>
+          <a:p>
+            <a:endParaRPr lang="en-US" sz="3200" dirty="0" smtClean="0"/>
+          </a:p>
+        </p:txBody>
+      </p:sp>
+    </p:spTree>
+    <p:extLst>
+      <p:ext uri="{BB962C8B-B14F-4D97-AF65-F5344CB8AC3E}">
+        <p14:creationId xmlns:p14="http://schemas.microsoft.com/office/powerpoint/2010/main" val="1245892544"/>
+      </p:ext>
+    </p:extLst>
+  </p:cSld>
+  <p:clrMapOvr>
+    <a:masterClrMapping/>
+  </p:clrMapOvr>
+</p:sld>
+</file>
+
+<file path=ppt/slides/slide47.xml><?xml version="1.0" encoding="utf-8"?>
+<p:sld xmlns:a="http://schemas.openxmlformats.org/drawingml/2006/main" xmlns:r="http://schemas.openxmlformats.org/officeDocument/2006/relationships" xmlns:p="http://schemas.openxmlformats.org/presentationml/2006/main">
+  <p:cSld>
+    <p:spTree>
+      <p:nvGrpSpPr>
+        <p:cNvPr id="1" name=""/>
+        <p:cNvGrpSpPr/>
+        <p:nvPr/>
+      </p:nvGrpSpPr>
+      <p:grpSpPr>
+        <a:xfrm>
+          <a:off x="0" y="0"/>
+          <a:ext cx="0" cy="0"/>
+          <a:chOff x="0" y="0"/>
+          <a:chExt cx="0" cy="0"/>
+        </a:xfrm>
+      </p:grpSpPr>
+      <p:sp>
+        <p:nvSpPr>
+          <p:cNvPr id="2" name="Title 1"/>
+          <p:cNvSpPr>
+            <a:spLocks noGrp="1"/>
+          </p:cNvSpPr>
+          <p:nvPr>
+            <p:ph type="title"/>
+          </p:nvPr>
+        </p:nvSpPr>
+        <p:spPr/>
+        <p:txBody>
+          <a:bodyPr numCol="1"/>
+          <a:lstStyle/>
+          <a:p>
+            <a:r>
+              <a:rPr/>
+              <a:t>Beumers’s Cinema the chapter by Richard Taylor, </a:t>
+            </a:r>
+            <a:endParaRPr lang="en-US" dirty="0"/>
+          </a:p>
+          <a:p>
+            <a:endParaRPr lang="en-US" dirty="0"/>
+          </a:p>
+        </p:txBody>
+      </p:sp>
+      <p:sp>
+        <p:nvSpPr>
+          <p:cNvPr id="3" name="Text Placeholder 2"/>
+          <p:cNvSpPr>
+            <a:spLocks noGrp="1"/>
+          </p:cNvSpPr>
+          <p:nvPr>
+            <p:ph type="body" idx="1"/>
+          </p:nvPr>
+        </p:nvSpPr>
+        <p:spPr/>
+        <p:txBody>
+          <a:bodyPr numCol="1"/>
+          <a:lstStyle/>
+          <a:p>
+            <a:r>
+              <a:rPr/>
+              <a:t>“THE STRIKE” (47–56).  EVERY PARAGRAPH</a:t>
+            </a:r>
+            <a:endParaRPr lang="en-US" dirty="0"/>
+          </a:p>
+          <a:p>
+            <a:endParaRPr lang="en-US" dirty="0"/>
+          </a:p>
+        </p:txBody>
+      </p:sp>
+    </p:spTree>
+    <p:extLst>
+      <p:ext uri="{BB962C8B-B14F-4D97-AF65-F5344CB8AC3E}">
+        <p14:creationId xmlns:p14="http://schemas.microsoft.com/office/powerpoint/2010/main" val="221988584"/>
+      </p:ext>
+    </p:extLst>
+  </p:cSld>
+  <p:clrMapOvr>
+    <a:masterClrMapping/>
+  </p:clrMapOvr>
+</p:sld>
+</file>
+
+<file path=ppt/slides/slide48.xml><?xml version="1.0" encoding="utf-8"?>
+<p:sld xmlns:a="http://schemas.openxmlformats.org/drawingml/2006/main" xmlns:r="http://schemas.openxmlformats.org/officeDocument/2006/relationships" xmlns:p="http://schemas.openxmlformats.org/presentationml/2006/main">
+  <p:cSld>
+    <p:spTree>
+      <p:nvGrpSpPr>
+        <p:cNvPr id="1" name=""/>
+        <p:cNvGrpSpPr/>
+        <p:nvPr/>
+      </p:nvGrpSpPr>
+      <p:grpSpPr>
+        <a:xfrm>
+          <a:off x="0" y="0"/>
+          <a:ext cx="0" cy="0"/>
+          <a:chOff x="0" y="0"/>
+          <a:chExt cx="0" cy="0"/>
+        </a:xfrm>
+      </p:grpSpPr>
+      <p:sp>
+        <p:nvSpPr>
+          <p:cNvPr id="3" name="Content Placeholder 2"/>
+          <p:cNvSpPr>
+            <a:spLocks noGrp="1"/>
+          </p:cNvSpPr>
+          <p:nvPr>
+            <p:ph idx="1"/>
+          </p:nvPr>
+        </p:nvSpPr>
+        <p:spPr>
+          <a:xfrm>
+            <a:off x="838200" y="161365"/>
+            <a:ext cx="10515600" cy="6015598"/>
+          </a:xfrm>
+        </p:spPr>
+        <p:txBody>
+          <a:bodyPr numCol="1">
+            <a:normAutofit/>
+          </a:bodyPr>
+          <a:lstStyle/>
+          <a:p>
+            <a:r>
+              <a:rPr lang="en-US" sz="3200" dirty="0" smtClean="0"/>
+              <a:t>P  47(pdf)</a:t>
+            </a:r>
+          </a:p>
+          <a:p>
+            <a:r>
+              <a:rPr sz="3200">
+                <a:solidFill>
+                  <a:schemeClr val="tx1"/>
+                </a:solidFill>
+                <a:latin typeface="+mn-lt"/>
+              </a:rPr>
+              <a:t>Eisen made the strike in 1925. </a:t>
+            </a:r>
+          </a:p>
+          <a:p>
+            <a:r>
+              <a:rPr sz="3200">
+                <a:solidFill>
+                  <a:schemeClr val="tx1"/>
+                </a:solidFill>
+                <a:latin typeface="+mn-lt"/>
+              </a:rPr>
+              <a:t>He tried to do things before but it failed, he got it tho</a:t>
+            </a:r>
+          </a:p>
+          <a:p>
+            <a:r>
+              <a:rPr sz="3200">
+                <a:solidFill>
+                  <a:schemeClr val="tx1"/>
+                </a:solidFill>
+                <a:latin typeface="+mn-lt"/>
+              </a:rPr>
+              <a:t>Made  Mabuse the Gambler in 1922 w/ Fritz Lang. His first film was The Wise Man. </a:t>
+            </a:r>
+          </a:p>
+          <a:p>
+            <a:r>
+              <a:rPr sz="3200">
+                <a:solidFill>
+                  <a:schemeClr val="tx1"/>
+                </a:solidFill>
+                <a:latin typeface="+mn-lt"/>
+              </a:rPr>
+              <a:t>He broke with Prolekut and became sole owner, the strike changed his life</a:t>
+            </a:r>
+          </a:p>
+          <a:p>
+            <a:endParaRPr sz="3200">
+              <a:solidFill>
+                <a:schemeClr val="tx1"/>
+              </a:solidFill>
+              <a:latin typeface="+mn-lt"/>
+            </a:endParaRPr>
+          </a:p>
+          <a:p>
+            <a:endParaRPr sz="3200">
+              <a:solidFill>
+                <a:schemeClr val="tx1"/>
+              </a:solidFill>
+              <a:latin typeface="+mn-lt"/>
+            </a:endParaRPr>
+          </a:p>
+          <a:p>
+            <a:endParaRPr lang="en-US" sz="3200" dirty="0" smtClean="0"/>
+          </a:p>
+          <a:p>
+            <a:endParaRPr lang="en-US" sz="3200" dirty="0" smtClean="0"/>
+          </a:p>
+          <a:p>
+            <a:endParaRPr lang="en-US" sz="3200" dirty="0" smtClean="0"/>
+          </a:p>
+          <a:p>
+            <a:endParaRPr lang="en-US" sz="3200" dirty="0" smtClean="0"/>
+          </a:p>
+        </p:txBody>
+      </p:sp>
+    </p:spTree>
+    <p:extLst>
+      <p:ext uri="{BB962C8B-B14F-4D97-AF65-F5344CB8AC3E}">
+        <p14:creationId xmlns:p14="http://schemas.microsoft.com/office/powerpoint/2010/main" val="1245892544"/>
+      </p:ext>
+    </p:extLst>
+  </p:cSld>
+  <p:clrMapOvr>
+    <a:masterClrMapping/>
+  </p:clrMapOvr>
+</p:sld>
+</file>
+
+<file path=ppt/slides/slide49.xml><?xml version="1.0" encoding="utf-8"?>
+<p:sld xmlns:a="http://schemas.openxmlformats.org/drawingml/2006/main" xmlns:r="http://schemas.openxmlformats.org/officeDocument/2006/relationships" xmlns:p="http://schemas.openxmlformats.org/presentationml/2006/main">
+  <p:cSld>
+    <p:spTree>
+      <p:nvGrpSpPr>
+        <p:cNvPr id="1" name=""/>
+        <p:cNvGrpSpPr/>
+        <p:nvPr/>
+      </p:nvGrpSpPr>
+      <p:grpSpPr>
+        <a:xfrm>
+          <a:off x="0" y="0"/>
+          <a:ext cx="0" cy="0"/>
+          <a:chOff x="0" y="0"/>
+          <a:chExt cx="0" cy="0"/>
+        </a:xfrm>
+      </p:grpSpPr>
+      <p:sp>
+        <p:nvSpPr>
+          <p:cNvPr id="3" name="Content Placeholder 2"/>
+          <p:cNvSpPr>
+            <a:spLocks noGrp="1"/>
+          </p:cNvSpPr>
+          <p:nvPr>
+            <p:ph idx="1"/>
+          </p:nvPr>
+        </p:nvSpPr>
+        <p:spPr>
+          <a:xfrm>
+            <a:off x="838200" y="161365"/>
+            <a:ext cx="10515600" cy="6015598"/>
+          </a:xfrm>
+        </p:spPr>
+        <p:txBody>
+          <a:bodyPr numCol="1">
+            <a:normAutofit/>
+          </a:bodyPr>
+          <a:lstStyle/>
+          <a:p>
+            <a:r>
+              <a:rPr lang="en-US" sz="3200" dirty="0" smtClean="0"/>
+              <a:t>P  48(pdf)</a:t>
+            </a:r>
+          </a:p>
+          <a:p>
+            <a:r>
+              <a:rPr sz="3200">
+                <a:solidFill>
+                  <a:schemeClr val="tx1"/>
+                </a:solidFill>
+                <a:latin typeface="+mn-lt"/>
+              </a:rPr>
+              <a:t>Eisen second file The Battleship Potemkin, was like the stike because it was revolutionary, all the extra- stuff was nt needed. </a:t>
+            </a:r>
+          </a:p>
+          <a:p>
+            <a:r>
+              <a:rPr sz="3200">
+                <a:solidFill>
+                  <a:schemeClr val="tx1"/>
+                </a:solidFill>
+                <a:latin typeface="+mn-lt"/>
+              </a:rPr>
+              <a:t>The strike was based off Lenin saying 'organization is everything' for the proletariat.  </a:t>
+            </a:r>
+          </a:p>
+          <a:p>
+            <a:r>
+              <a:rPr sz="3200">
+                <a:solidFill>
+                  <a:schemeClr val="tx1"/>
+                </a:solidFill>
+                <a:latin typeface="+mn-lt"/>
+              </a:rPr>
+              <a:t>Movie starts off as 1. 'All is calm in the factory' but then trouble slowly brews, othr guy was spy working in the factory</a:t>
+            </a:r>
+          </a:p>
+          <a:p>
+            <a:endParaRPr sz="3200">
+              <a:solidFill>
+                <a:schemeClr val="tx1"/>
+              </a:solidFill>
+              <a:latin typeface="+mn-lt"/>
+            </a:endParaRPr>
+          </a:p>
+          <a:p>
+            <a:endParaRPr sz="3200">
+              <a:solidFill>
+                <a:schemeClr val="tx1"/>
+              </a:solidFill>
+              <a:latin typeface="+mn-lt"/>
+            </a:endParaRPr>
+          </a:p>
+          <a:p>
+            <a:endParaRPr lang="en-US" sz="3200" dirty="0" smtClean="0"/>
+          </a:p>
+          <a:p>
+            <a:endParaRPr lang="en-US" sz="3200" dirty="0" smtClean="0"/>
+          </a:p>
+          <a:p>
+            <a:endParaRPr lang="en-US" sz="3200" dirty="0" smtClean="0"/>
+          </a:p>
+          <a:p>
+            <a:endParaRPr lang="en-US" sz="3200" dirty="0" smtClean="0"/>
+          </a:p>
+        </p:txBody>
+      </p:sp>
+    </p:spTree>
+    <p:extLst>
+      <p:ext uri="{BB962C8B-B14F-4D97-AF65-F5344CB8AC3E}">
+        <p14:creationId xmlns:p14="http://schemas.microsoft.com/office/powerpoint/2010/main" val="1245892544"/>
       </p:ext>
     </p:extLst>
   </p:cSld>
@@ -6321,7 +7753,7 @@
           </a:xfrm>
         </p:spPr>
         <p:txBody>
-          <a:bodyPr>
+          <a:bodyPr numCol="1">
             <a:normAutofit/>
           </a:bodyPr>
           <a:lstStyle/>
@@ -6413,6 +7845,700 @@
     <p:extLst>
       <p:ext uri="{BB962C8B-B14F-4D97-AF65-F5344CB8AC3E}">
         <p14:creationId xmlns:p14="http://schemas.microsoft.com/office/powerpoint/2010/main" val="3585861728"/>
+      </p:ext>
+    </p:extLst>
+  </p:cSld>
+  <p:clrMapOvr>
+    <a:masterClrMapping/>
+  </p:clrMapOvr>
+</p:sld>
+</file>
+
+<file path=ppt/slides/slide50.xml><?xml version="1.0" encoding="utf-8"?>
+<p:sld xmlns:a="http://schemas.openxmlformats.org/drawingml/2006/main" xmlns:r="http://schemas.openxmlformats.org/officeDocument/2006/relationships" xmlns:p="http://schemas.openxmlformats.org/presentationml/2006/main">
+  <p:cSld>
+    <p:spTree>
+      <p:nvGrpSpPr>
+        <p:cNvPr id="1" name=""/>
+        <p:cNvGrpSpPr/>
+        <p:nvPr/>
+      </p:nvGrpSpPr>
+      <p:grpSpPr>
+        <a:xfrm>
+          <a:off x="0" y="0"/>
+          <a:ext cx="0" cy="0"/>
+          <a:chOff x="0" y="0"/>
+          <a:chExt cx="0" cy="0"/>
+        </a:xfrm>
+      </p:grpSpPr>
+      <p:sp>
+        <p:nvSpPr>
+          <p:cNvPr id="3" name="Content Placeholder 2"/>
+          <p:cNvSpPr>
+            <a:spLocks noGrp="1"/>
+          </p:cNvSpPr>
+          <p:nvPr>
+            <p:ph idx="1"/>
+          </p:nvPr>
+        </p:nvSpPr>
+        <p:spPr>
+          <a:xfrm>
+            <a:off x="838200" y="161365"/>
+            <a:ext cx="10515600" cy="6015598"/>
+          </a:xfrm>
+        </p:spPr>
+        <p:txBody>
+          <a:bodyPr numCol="1">
+            <a:normAutofit/>
+          </a:bodyPr>
+          <a:lstStyle/>
+          <a:p>
+            <a:r>
+              <a:rPr lang="en-US" sz="3200" dirty="0" smtClean="0"/>
+              <a:t>P  49(pdf)</a:t>
+            </a:r>
+          </a:p>
+          <a:p>
+            <a:r>
+              <a:rPr sz="3200">
+                <a:solidFill>
+                  <a:schemeClr val="tx1"/>
+                </a:solidFill>
+                <a:latin typeface="+mn-lt"/>
+              </a:rPr>
+              <a:t>Two sides are established, the lone capitalists, and the organised workers.  The workers have meetings in the water, bathroom, </a:t>
+            </a:r>
+            <a:r>
+              <a:rPr sz="3000"/>
+              <a:t>but they find whoever is spying on them always. </a:t>
+            </a:r>
+          </a:p>
+          <a:p>
+            <a:r>
+              <a:rPr sz="3000"/>
+              <a:t>They go to a pinic, in the factory yard, they knock down a spy with the wheel. </a:t>
+            </a:r>
+          </a:p>
+          <a:p>
+            <a:r>
+              <a:rPr sz="3000"/>
+              <a:t>Second part is called a reason to strike, guy loses his micometer, when he goes to the office they say he stole it, he kills himself as a result</a:t>
+            </a:r>
+          </a:p>
+          <a:p>
+            <a:endParaRPr sz="3000"/>
+          </a:p>
+          <a:p>
+            <a:endParaRPr sz="3000"/>
+          </a:p>
+          <a:p>
+            <a:endParaRPr lang="en-US" sz="3200" dirty="0" smtClean="0"/>
+          </a:p>
+          <a:p>
+            <a:endParaRPr lang="en-US" sz="3200" dirty="0" smtClean="0"/>
+          </a:p>
+          <a:p>
+            <a:endParaRPr lang="en-US" sz="3200" dirty="0" smtClean="0"/>
+          </a:p>
+          <a:p>
+            <a:endParaRPr lang="en-US" sz="3200" dirty="0" smtClean="0"/>
+          </a:p>
+        </p:txBody>
+      </p:sp>
+    </p:spTree>
+    <p:extLst>
+      <p:ext uri="{BB962C8B-B14F-4D97-AF65-F5344CB8AC3E}">
+        <p14:creationId xmlns:p14="http://schemas.microsoft.com/office/powerpoint/2010/main" val="1245892544"/>
+      </p:ext>
+    </p:extLst>
+  </p:cSld>
+  <p:clrMapOvr>
+    <a:masterClrMapping/>
+  </p:clrMapOvr>
+</p:sld>
+</file>
+
+<file path=ppt/slides/slide51.xml><?xml version="1.0" encoding="utf-8"?>
+<p:sld xmlns:a="http://schemas.openxmlformats.org/drawingml/2006/main" xmlns:r="http://schemas.openxmlformats.org/officeDocument/2006/relationships" xmlns:p="http://schemas.openxmlformats.org/presentationml/2006/main">
+  <p:cSld>
+    <p:spTree>
+      <p:nvGrpSpPr>
+        <p:cNvPr id="1" name=""/>
+        <p:cNvGrpSpPr/>
+        <p:nvPr/>
+      </p:nvGrpSpPr>
+      <p:grpSpPr>
+        <a:xfrm>
+          <a:off x="0" y="0"/>
+          <a:ext cx="0" cy="0"/>
+          <a:chOff x="0" y="0"/>
+          <a:chExt cx="0" cy="0"/>
+        </a:xfrm>
+      </p:grpSpPr>
+      <p:sp>
+        <p:nvSpPr>
+          <p:cNvPr id="3" name="Content Placeholder 2"/>
+          <p:cNvSpPr>
+            <a:spLocks noGrp="1"/>
+          </p:cNvSpPr>
+          <p:nvPr>
+            <p:ph idx="1"/>
+          </p:nvPr>
+        </p:nvSpPr>
+        <p:spPr>
+          <a:xfrm>
+            <a:off x="838200" y="161365"/>
+            <a:ext cx="10515600" cy="6015598"/>
+          </a:xfrm>
+        </p:spPr>
+        <p:txBody>
+          <a:bodyPr numCol="1">
+            <a:normAutofit/>
+          </a:bodyPr>
+          <a:lstStyle/>
+          <a:p>
+            <a:r>
+              <a:rPr lang="en-US" sz="3200" dirty="0" smtClean="0"/>
+              <a:t>P </a:t>
+            </a:r>
+            <a:r>
+              <a:rPr sz="3200">
+                <a:solidFill>
+                  <a:schemeClr val="tx1"/>
+                </a:solidFill>
+                <a:latin typeface="+mn-lt"/>
+              </a:rPr>
+              <a:t> 50(pdf)</a:t>
+            </a:r>
+          </a:p>
+          <a:p>
+            <a:r>
+              <a:rPr sz="3200">
+                <a:solidFill>
+                  <a:schemeClr val="tx1"/>
+                </a:solidFill>
+                <a:latin typeface="+mn-lt"/>
+              </a:rPr>
+              <a:t>The locomotive was a sign of the peoples power. the hat in the water was a sign of rich ppl impotence. </a:t>
+            </a:r>
+          </a:p>
+          <a:p>
+            <a:r>
+              <a:rPr sz="3200">
+                <a:solidFill>
+                  <a:schemeClr val="tx1"/>
+                </a:solidFill>
+                <a:latin typeface="+mn-lt"/>
+              </a:rPr>
+              <a:t>Third section 'the plant stood still' children', cats,pigs, n ducklings represent nature &amp; life. The lemon represents rejection of the workers requests. </a:t>
+            </a:r>
+          </a:p>
+          <a:p>
+            <a:r>
+              <a:rPr lang="en-US" sz="3200" dirty="0" smtClean="0"/>
+              <a:t>the fourth section 'The strike drags on' food store closes, ppl starve, spy takes pic of man taking off image, gets him beaten then becomes a tratior identify the enemies</a:t>
+            </a:r>
+          </a:p>
+          <a:p>
+            <a:endParaRPr lang="en-US" sz="3200" dirty="0" smtClean="0"/>
+          </a:p>
+          <a:p>
+            <a:endParaRPr lang="en-US" sz="3200" dirty="0" smtClean="0"/>
+          </a:p>
+          <a:p>
+            <a:endParaRPr lang="en-US" sz="3200" dirty="0" smtClean="0"/>
+          </a:p>
+          <a:p>
+            <a:endParaRPr lang="en-US" sz="3200" dirty="0" smtClean="0"/>
+          </a:p>
+          <a:p>
+            <a:endParaRPr lang="en-US" sz="3200" dirty="0" smtClean="0"/>
+          </a:p>
+          <a:p>
+            <a:endParaRPr lang="en-US" sz="3200" dirty="0" smtClean="0"/>
+          </a:p>
+          <a:p>
+            <a:endParaRPr lang="en-US" sz="3200" dirty="0" smtClean="0"/>
+          </a:p>
+        </p:txBody>
+      </p:sp>
+    </p:spTree>
+    <p:extLst>
+      <p:ext uri="{BB962C8B-B14F-4D97-AF65-F5344CB8AC3E}">
+        <p14:creationId xmlns:p14="http://schemas.microsoft.com/office/powerpoint/2010/main" val="1245892544"/>
+      </p:ext>
+    </p:extLst>
+  </p:cSld>
+  <p:clrMapOvr>
+    <a:masterClrMapping/>
+  </p:clrMapOvr>
+</p:sld>
+</file>
+
+<file path=ppt/slides/slide52.xml><?xml version="1.0" encoding="utf-8"?>
+<p:sld xmlns:a="http://schemas.openxmlformats.org/drawingml/2006/main" xmlns:r="http://schemas.openxmlformats.org/officeDocument/2006/relationships" xmlns:p="http://schemas.openxmlformats.org/presentationml/2006/main">
+  <p:cSld>
+    <p:spTree>
+      <p:nvGrpSpPr>
+        <p:cNvPr id="1" name=""/>
+        <p:cNvGrpSpPr/>
+        <p:nvPr/>
+      </p:nvGrpSpPr>
+      <p:grpSpPr>
+        <a:xfrm>
+          <a:off x="0" y="0"/>
+          <a:ext cx="0" cy="0"/>
+          <a:chOff x="0" y="0"/>
+          <a:chExt cx="0" cy="0"/>
+        </a:xfrm>
+      </p:grpSpPr>
+      <p:sp>
+        <p:nvSpPr>
+          <p:cNvPr id="3" name="Content Placeholder 2"/>
+          <p:cNvSpPr>
+            <a:spLocks noGrp="1"/>
+          </p:cNvSpPr>
+          <p:nvPr>
+            <p:ph idx="1"/>
+          </p:nvPr>
+        </p:nvSpPr>
+        <p:spPr>
+          <a:xfrm>
+            <a:off x="838200" y="161365"/>
+            <a:ext cx="10515600" cy="6015598"/>
+          </a:xfrm>
+        </p:spPr>
+        <p:txBody>
+          <a:bodyPr numCol="1">
+            <a:normAutofit/>
+          </a:bodyPr>
+          <a:lstStyle/>
+          <a:p>
+            <a:r>
+              <a:rPr lang="en-US" sz="3200" dirty="0" smtClean="0"/>
+              <a:t>P </a:t>
+            </a:r>
+            <a:r>
+              <a:rPr sz="3200">
+                <a:solidFill>
+                  <a:schemeClr val="tx1"/>
+                </a:solidFill>
+                <a:latin typeface="+mn-lt"/>
+              </a:rPr>
+              <a:t> 51(pdf)</a:t>
+            </a:r>
+          </a:p>
+          <a:p>
+            <a:r>
+              <a:rPr sz="3200">
+                <a:solidFill>
+                  <a:schemeClr val="tx1"/>
+                </a:solidFill>
+                <a:latin typeface="+mn-lt"/>
+              </a:rPr>
+              <a:t>The fifth part 'provocation to disaster' some agent goes to the underworld, and their leaders chooses a group of ppl from barrels to cause trouble. The owl follows a group of ppl through the steets. </a:t>
+            </a:r>
+          </a:p>
+          <a:p>
+            <a:r>
+              <a:rPr sz="3200">
+                <a:solidFill>
+                  <a:schemeClr val="tx1"/>
+                </a:solidFill>
+                <a:latin typeface="+mn-lt"/>
+              </a:rPr>
+              <a:t>The criminals burn down  a building a firefighters are called, but they turn the hoses on the workers and flush out the ringleaders. </a:t>
+            </a:r>
+          </a:p>
+          <a:p>
+            <a:endParaRPr sz="3200">
+              <a:solidFill>
+                <a:schemeClr val="tx1"/>
+              </a:solidFill>
+              <a:latin typeface="+mn-lt"/>
+            </a:endParaRPr>
+          </a:p>
+          <a:p>
+            <a:endParaRPr sz="3200">
+              <a:solidFill>
+                <a:schemeClr val="tx1"/>
+              </a:solidFill>
+              <a:latin typeface="+mn-lt"/>
+            </a:endParaRPr>
+          </a:p>
+          <a:p>
+            <a:endParaRPr sz="3200">
+              <a:solidFill>
+                <a:schemeClr val="tx1"/>
+              </a:solidFill>
+              <a:latin typeface="+mn-lt"/>
+            </a:endParaRPr>
+          </a:p>
+          <a:p>
+            <a:endParaRPr lang="en-US" sz="3200" dirty="0" smtClean="0"/>
+          </a:p>
+          <a:p>
+            <a:endParaRPr lang="en-US" sz="3200" dirty="0" smtClean="0"/>
+          </a:p>
+          <a:p>
+            <a:endParaRPr lang="en-US" sz="3200" dirty="0" smtClean="0"/>
+          </a:p>
+          <a:p>
+            <a:endParaRPr lang="en-US" sz="3200" dirty="0" smtClean="0"/>
+          </a:p>
+        </p:txBody>
+      </p:sp>
+    </p:spTree>
+    <p:extLst>
+      <p:ext uri="{BB962C8B-B14F-4D97-AF65-F5344CB8AC3E}">
+        <p14:creationId xmlns:p14="http://schemas.microsoft.com/office/powerpoint/2010/main" val="1245892544"/>
+      </p:ext>
+    </p:extLst>
+  </p:cSld>
+  <p:clrMapOvr>
+    <a:masterClrMapping/>
+  </p:clrMapOvr>
+</p:sld>
+</file>
+
+<file path=ppt/slides/slide53.xml><?xml version="1.0" encoding="utf-8"?>
+<p:sld xmlns:a="http://schemas.openxmlformats.org/drawingml/2006/main" xmlns:r="http://schemas.openxmlformats.org/officeDocument/2006/relationships" xmlns:p="http://schemas.openxmlformats.org/presentationml/2006/main">
+  <p:cSld>
+    <p:spTree>
+      <p:nvGrpSpPr>
+        <p:cNvPr id="1" name=""/>
+        <p:cNvGrpSpPr/>
+        <p:nvPr/>
+      </p:nvGrpSpPr>
+      <p:grpSpPr>
+        <a:xfrm>
+          <a:off x="0" y="0"/>
+          <a:ext cx="0" cy="0"/>
+          <a:chOff x="0" y="0"/>
+          <a:chExt cx="0" cy="0"/>
+        </a:xfrm>
+      </p:grpSpPr>
+      <p:sp>
+        <p:nvSpPr>
+          <p:cNvPr id="3" name="Content Placeholder 2"/>
+          <p:cNvSpPr>
+            <a:spLocks noGrp="1"/>
+          </p:cNvSpPr>
+          <p:nvPr>
+            <p:ph idx="1"/>
+          </p:nvPr>
+        </p:nvSpPr>
+        <p:spPr>
+          <a:xfrm>
+            <a:off x="838200" y="161365"/>
+            <a:ext cx="10515600" cy="6015598"/>
+          </a:xfrm>
+        </p:spPr>
+        <p:txBody>
+          <a:bodyPr numCol="1">
+            <a:normAutofit/>
+          </a:bodyPr>
+          <a:lstStyle/>
+          <a:p>
+            <a:r>
+              <a:rPr lang="en-US" sz="3200" dirty="0" smtClean="0"/>
+              <a:t>P </a:t>
+            </a:r>
+            <a:r>
+              <a:rPr sz="3200">
+                <a:solidFill>
+                  <a:schemeClr val="tx1"/>
+                </a:solidFill>
+                <a:latin typeface="+mn-lt"/>
+              </a:rPr>
+              <a:t> 52(pdf)</a:t>
+            </a:r>
+          </a:p>
+          <a:p>
+            <a:r>
+              <a:rPr sz="3200">
+                <a:solidFill>
+                  <a:schemeClr val="tx1"/>
+                </a:solidFill>
+                <a:latin typeface="+mn-lt"/>
+              </a:rPr>
+              <a:t>The sixth part 'Liquidation' the calvary comes in and gets reckless. The worker denies to help and is sent back to his cell. </a:t>
+            </a:r>
+          </a:p>
+          <a:p>
+            <a:r>
+              <a:rPr sz="3200">
+                <a:solidFill>
+                  <a:schemeClr val="tx1"/>
+                </a:solidFill>
+                <a:latin typeface="+mn-lt"/>
+              </a:rPr>
+              <a:t>Eisen uses a cattle  killed to describe whats going on.He did the montage the way he did to achieve the most brilliant death scene</a:t>
+            </a:r>
+          </a:p>
+          <a:p>
+            <a:endParaRPr sz="3200">
+              <a:solidFill>
+                <a:schemeClr val="tx1"/>
+              </a:solidFill>
+              <a:latin typeface="+mn-lt"/>
+            </a:endParaRPr>
+          </a:p>
+          <a:p>
+            <a:endParaRPr sz="3200">
+              <a:solidFill>
+                <a:schemeClr val="tx1"/>
+              </a:solidFill>
+              <a:latin typeface="+mn-lt"/>
+            </a:endParaRPr>
+          </a:p>
+          <a:p>
+            <a:endParaRPr sz="3200">
+              <a:solidFill>
+                <a:schemeClr val="tx1"/>
+              </a:solidFill>
+              <a:latin typeface="+mn-lt"/>
+            </a:endParaRPr>
+          </a:p>
+          <a:p>
+            <a:endParaRPr lang="en-US" sz="3200" dirty="0" smtClean="0"/>
+          </a:p>
+          <a:p>
+            <a:endParaRPr lang="en-US" sz="3200" dirty="0" smtClean="0"/>
+          </a:p>
+          <a:p>
+            <a:endParaRPr lang="en-US" sz="3200" dirty="0" smtClean="0"/>
+          </a:p>
+          <a:p>
+            <a:endParaRPr lang="en-US" sz="3200" dirty="0" smtClean="0"/>
+          </a:p>
+        </p:txBody>
+      </p:sp>
+    </p:spTree>
+    <p:extLst>
+      <p:ext uri="{BB962C8B-B14F-4D97-AF65-F5344CB8AC3E}">
+        <p14:creationId xmlns:p14="http://schemas.microsoft.com/office/powerpoint/2010/main" val="1245892544"/>
+      </p:ext>
+    </p:extLst>
+  </p:cSld>
+  <p:clrMapOvr>
+    <a:masterClrMapping/>
+  </p:clrMapOvr>
+</p:sld>
+</file>
+
+<file path=ppt/slides/slide54.xml><?xml version="1.0" encoding="utf-8"?>
+<p:sld xmlns:a="http://schemas.openxmlformats.org/drawingml/2006/main" xmlns:r="http://schemas.openxmlformats.org/officeDocument/2006/relationships" xmlns:p="http://schemas.openxmlformats.org/presentationml/2006/main">
+  <p:cSld>
+    <p:spTree>
+      <p:nvGrpSpPr>
+        <p:cNvPr id="1" name=""/>
+        <p:cNvGrpSpPr/>
+        <p:nvPr/>
+      </p:nvGrpSpPr>
+      <p:grpSpPr>
+        <a:xfrm>
+          <a:off x="0" y="0"/>
+          <a:ext cx="0" cy="0"/>
+          <a:chOff x="0" y="0"/>
+          <a:chExt cx="0" cy="0"/>
+        </a:xfrm>
+      </p:grpSpPr>
+      <p:sp>
+        <p:nvSpPr>
+          <p:cNvPr id="3" name="Content Placeholder 2"/>
+          <p:cNvSpPr>
+            <a:spLocks noGrp="1"/>
+          </p:cNvSpPr>
+          <p:nvPr>
+            <p:ph idx="1"/>
+          </p:nvPr>
+        </p:nvSpPr>
+        <p:spPr>
+          <a:xfrm>
+            <a:off x="838200" y="161365"/>
+            <a:ext cx="10515600" cy="6015598"/>
+          </a:xfrm>
+        </p:spPr>
+        <p:txBody>
+          <a:bodyPr numCol="1">
+            <a:normAutofit/>
+          </a:bodyPr>
+          <a:lstStyle/>
+          <a:p>
+            <a:r>
+              <a:rPr lang="en-US" sz="3200" dirty="0" smtClean="0"/>
+              <a:t>P </a:t>
+            </a:r>
+            <a:r>
+              <a:rPr sz="3200">
+                <a:solidFill>
+                  <a:schemeClr val="tx1"/>
+                </a:solidFill>
+                <a:latin typeface="+mn-lt"/>
+              </a:rPr>
+              <a:t> 54(pdf).</a:t>
+            </a:r>
+          </a:p>
+          <a:p>
+            <a:r>
+              <a:rPr sz="3200">
+                <a:solidFill>
+                  <a:schemeClr val="tx1"/>
+                </a:solidFill>
+                <a:latin typeface="+mn-lt"/>
+              </a:rPr>
+              <a:t>( pg 53 was just scenes from part six).I do not understand the first paragraph. </a:t>
+            </a:r>
+          </a:p>
+          <a:p>
+            <a:r>
+              <a:rPr sz="3200">
+                <a:solidFill>
+                  <a:schemeClr val="tx1"/>
+                </a:solidFill>
+                <a:latin typeface="+mn-lt"/>
+              </a:rPr>
+              <a:t>Although it received  a gold medal, ppl didn;'t like the film, they said it was hard to know what was going on</a:t>
+            </a:r>
+          </a:p>
+          <a:p>
+            <a:endParaRPr sz="3200">
+              <a:solidFill>
+                <a:schemeClr val="tx1"/>
+              </a:solidFill>
+              <a:latin typeface="+mn-lt"/>
+            </a:endParaRPr>
+          </a:p>
+          <a:p>
+            <a:endParaRPr sz="3200">
+              <a:solidFill>
+                <a:schemeClr val="tx1"/>
+              </a:solidFill>
+              <a:latin typeface="+mn-lt"/>
+            </a:endParaRPr>
+          </a:p>
+          <a:p>
+            <a:endParaRPr sz="3200">
+              <a:solidFill>
+                <a:schemeClr val="tx1"/>
+              </a:solidFill>
+              <a:latin typeface="+mn-lt"/>
+            </a:endParaRPr>
+          </a:p>
+          <a:p>
+            <a:endParaRPr lang="en-US" sz="3200" dirty="0" smtClean="0"/>
+          </a:p>
+          <a:p>
+            <a:endParaRPr lang="en-US" sz="3200" dirty="0" smtClean="0"/>
+          </a:p>
+          <a:p>
+            <a:endParaRPr lang="en-US" sz="3200" dirty="0" smtClean="0"/>
+          </a:p>
+          <a:p>
+            <a:endParaRPr lang="en-US" sz="3200" dirty="0" smtClean="0"/>
+          </a:p>
+        </p:txBody>
+      </p:sp>
+    </p:spTree>
+    <p:extLst>
+      <p:ext uri="{BB962C8B-B14F-4D97-AF65-F5344CB8AC3E}">
+        <p14:creationId xmlns:p14="http://schemas.microsoft.com/office/powerpoint/2010/main" val="1245892544"/>
+      </p:ext>
+    </p:extLst>
+  </p:cSld>
+  <p:clrMapOvr>
+    <a:masterClrMapping/>
+  </p:clrMapOvr>
+</p:sld>
+</file>
+
+<file path=ppt/slides/slide55.xml><?xml version="1.0" encoding="utf-8"?>
+<p:sld xmlns:a="http://schemas.openxmlformats.org/drawingml/2006/main" xmlns:r="http://schemas.openxmlformats.org/officeDocument/2006/relationships" xmlns:p="http://schemas.openxmlformats.org/presentationml/2006/main">
+  <p:cSld>
+    <p:spTree>
+      <p:nvGrpSpPr>
+        <p:cNvPr id="1" name=""/>
+        <p:cNvGrpSpPr/>
+        <p:nvPr/>
+      </p:nvGrpSpPr>
+      <p:grpSpPr>
+        <a:xfrm>
+          <a:off x="0" y="0"/>
+          <a:ext cx="0" cy="0"/>
+          <a:chOff x="0" y="0"/>
+          <a:chExt cx="0" cy="0"/>
+        </a:xfrm>
+      </p:grpSpPr>
+      <p:sp>
+        <p:nvSpPr>
+          <p:cNvPr id="3" name="Content Placeholder 2"/>
+          <p:cNvSpPr>
+            <a:spLocks noGrp="1"/>
+          </p:cNvSpPr>
+          <p:nvPr>
+            <p:ph idx="1"/>
+          </p:nvPr>
+        </p:nvSpPr>
+        <p:spPr>
+          <a:xfrm>
+            <a:off x="838200" y="161365"/>
+            <a:ext cx="10515600" cy="6015598"/>
+          </a:xfrm>
+        </p:spPr>
+        <p:txBody>
+          <a:bodyPr numCol="1">
+            <a:normAutofit/>
+          </a:bodyPr>
+          <a:lstStyle/>
+          <a:p>
+            <a:r>
+              <a:rPr lang="en-US" sz="3200" dirty="0" smtClean="0"/>
+              <a:t>P </a:t>
+            </a:r>
+            <a:r>
+              <a:rPr sz="3200">
+                <a:solidFill>
+                  <a:schemeClr val="tx1"/>
+                </a:solidFill>
+                <a:latin typeface="+mn-lt"/>
+              </a:rPr>
+              <a:t> 55(pdf).</a:t>
+            </a:r>
+          </a:p>
+          <a:p>
+            <a:r>
+              <a:rPr/>
+              <a:t>However it would serve as the basis of his films, thats where Russian culture, artistic innovations and syntagmatic (complex use of poetry</a:t>
+            </a:r>
+          </a:p>
+          <a:p>
+            <a:endParaRPr/>
+          </a:p>
+          <a:p>
+            <a:endParaRPr/>
+          </a:p>
+          <a:p>
+            <a:endParaRPr/>
+          </a:p>
+          <a:p>
+            <a:endParaRPr lang="en-US" sz="3200" dirty="0" smtClean="0"/>
+          </a:p>
+          <a:p>
+            <a:endParaRPr lang="en-US" sz="3200" dirty="0" smtClean="0"/>
+          </a:p>
+          <a:p>
+            <a:endParaRPr lang="en-US" sz="3200" dirty="0" smtClean="0"/>
+          </a:p>
+          <a:p>
+            <a:endParaRPr lang="en-US" sz="3200" dirty="0" smtClean="0"/>
+          </a:p>
+        </p:txBody>
+      </p:sp>
+    </p:spTree>
+    <p:extLst>
+      <p:ext uri="{BB962C8B-B14F-4D97-AF65-F5344CB8AC3E}">
+        <p14:creationId xmlns:p14="http://schemas.microsoft.com/office/powerpoint/2010/main" val="1245892544"/>
       </p:ext>
     </p:extLst>
   </p:cSld>
@@ -6456,7 +8582,7 @@
           </a:xfrm>
         </p:spPr>
         <p:txBody>
-          <a:bodyPr>
+          <a:bodyPr numCol="1">
             <a:normAutofit/>
           </a:bodyPr>
           <a:lstStyle/>
@@ -6550,7 +8676,7 @@
           </a:xfrm>
         </p:spPr>
         <p:txBody>
-          <a:bodyPr>
+          <a:bodyPr numCol="1">
             <a:normAutofit/>
           </a:bodyPr>
           <a:lstStyle/>
@@ -6633,7 +8759,7 @@
           </a:xfrm>
         </p:spPr>
         <p:txBody>
-          <a:bodyPr>
+          <a:bodyPr numCol="1">
             <a:normAutofit/>
           </a:bodyPr>
           <a:lstStyle/>
@@ -6738,7 +8864,7 @@
           </a:xfrm>
         </p:spPr>
         <p:txBody>
-          <a:bodyPr>
+          <a:bodyPr numCol="1">
             <a:normAutofit/>
           </a:bodyPr>
           <a:lstStyle/>

</xml_diff>